<commit_message>
slides: terminal, others rounded out ; example directory tree
</commit_message>
<xml_diff>
--- a/slides/context.pptx
+++ b/slides/context.pptx
@@ -396,7 +396,7 @@
           <a:p>
             <a:fld id="{51673806-0BCD-1F42-BAA8-2011034B3C6A}" type="datetimeFigureOut">
               <a:rPr lang="en-US" smtClean="0"/>
-              <a:t>4/28/20</a:t>
+              <a:t>5/6/20</a:t>
             </a:fld>
             <a:endParaRPr lang="en-US"/>
           </a:p>
@@ -810,7 +810,7 @@
           <a:p>
             <a:fld id="{51673806-0BCD-1F42-BAA8-2011034B3C6A}" type="datetimeFigureOut">
               <a:rPr lang="en-US" smtClean="0"/>
-              <a:t>4/28/20</a:t>
+              <a:t>5/6/20</a:t>
             </a:fld>
             <a:endParaRPr lang="en-US"/>
           </a:p>
@@ -1141,7 +1141,7 @@
           <a:p>
             <a:fld id="{51673806-0BCD-1F42-BAA8-2011034B3C6A}" type="datetimeFigureOut">
               <a:rPr lang="en-US" smtClean="0"/>
-              <a:t>4/28/20</a:t>
+              <a:t>5/6/20</a:t>
             </a:fld>
             <a:endParaRPr lang="en-US"/>
           </a:p>
@@ -1541,7 +1541,7 @@
           <a:p>
             <a:fld id="{51673806-0BCD-1F42-BAA8-2011034B3C6A}" type="datetimeFigureOut">
               <a:rPr lang="en-US" smtClean="0"/>
-              <a:t>4/28/20</a:t>
+              <a:t>5/6/20</a:t>
             </a:fld>
             <a:endParaRPr lang="en-US"/>
           </a:p>
@@ -2104,7 +2104,7 @@
           <a:p>
             <a:fld id="{51673806-0BCD-1F42-BAA8-2011034B3C6A}" type="datetimeFigureOut">
               <a:rPr lang="en-US" smtClean="0"/>
-              <a:t>4/28/20</a:t>
+              <a:t>5/6/20</a:t>
             </a:fld>
             <a:endParaRPr lang="en-US"/>
           </a:p>
@@ -2780,7 +2780,7 @@
           <a:p>
             <a:fld id="{51673806-0BCD-1F42-BAA8-2011034B3C6A}" type="datetimeFigureOut">
               <a:rPr lang="en-US" smtClean="0"/>
-              <a:t>4/28/20</a:t>
+              <a:t>5/6/20</a:t>
             </a:fld>
             <a:endParaRPr lang="en-US"/>
           </a:p>
@@ -3688,7 +3688,7 @@
           <a:p>
             <a:fld id="{51673806-0BCD-1F42-BAA8-2011034B3C6A}" type="datetimeFigureOut">
               <a:rPr lang="en-US" smtClean="0"/>
-              <a:t>4/28/20</a:t>
+              <a:t>5/6/20</a:t>
             </a:fld>
             <a:endParaRPr lang="en-US"/>
           </a:p>
@@ -3996,7 +3996,7 @@
           <a:p>
             <a:fld id="{51673806-0BCD-1F42-BAA8-2011034B3C6A}" type="datetimeFigureOut">
               <a:rPr lang="en-US" smtClean="0"/>
-              <a:t>4/28/20</a:t>
+              <a:t>5/6/20</a:t>
             </a:fld>
             <a:endParaRPr lang="en-US"/>
           </a:p>
@@ -4255,7 +4255,7 @@
           <a:p>
             <a:fld id="{51673806-0BCD-1F42-BAA8-2011034B3C6A}" type="datetimeFigureOut">
               <a:rPr lang="en-US" smtClean="0"/>
-              <a:t>4/28/20</a:t>
+              <a:t>5/6/20</a:t>
             </a:fld>
             <a:endParaRPr lang="en-US"/>
           </a:p>
@@ -4578,7 +4578,7 @@
           <a:p>
             <a:fld id="{51673806-0BCD-1F42-BAA8-2011034B3C6A}" type="datetimeFigureOut">
               <a:rPr lang="en-US" smtClean="0"/>
-              <a:t>4/28/20</a:t>
+              <a:t>5/6/20</a:t>
             </a:fld>
             <a:endParaRPr lang="en-US"/>
           </a:p>
@@ -4962,7 +4962,7 @@
           <a:p>
             <a:fld id="{51673806-0BCD-1F42-BAA8-2011034B3C6A}" type="datetimeFigureOut">
               <a:rPr lang="en-US" smtClean="0"/>
-              <a:t>4/28/20</a:t>
+              <a:t>5/6/20</a:t>
             </a:fld>
             <a:endParaRPr lang="en-US"/>
           </a:p>
@@ -5338,7 +5338,7 @@
           <a:p>
             <a:fld id="{51673806-0BCD-1F42-BAA8-2011034B3C6A}" type="datetimeFigureOut">
               <a:rPr lang="en-US" smtClean="0"/>
-              <a:t>4/28/20</a:t>
+              <a:t>5/6/20</a:t>
             </a:fld>
             <a:endParaRPr lang="en-US"/>
           </a:p>
@@ -5844,7 +5844,7 @@
           <a:p>
             <a:fld id="{51673806-0BCD-1F42-BAA8-2011034B3C6A}" type="datetimeFigureOut">
               <a:rPr lang="en-US" smtClean="0"/>
-              <a:t>4/28/20</a:t>
+              <a:t>5/6/20</a:t>
             </a:fld>
             <a:endParaRPr lang="en-US"/>
           </a:p>
@@ -6101,7 +6101,7 @@
           <a:p>
             <a:fld id="{51673806-0BCD-1F42-BAA8-2011034B3C6A}" type="datetimeFigureOut">
               <a:rPr lang="en-US" smtClean="0"/>
-              <a:t>4/28/20</a:t>
+              <a:t>5/6/20</a:t>
             </a:fld>
             <a:endParaRPr lang="en-US"/>
           </a:p>
@@ -6259,7 +6259,7 @@
           <a:p>
             <a:fld id="{51673806-0BCD-1F42-BAA8-2011034B3C6A}" type="datetimeFigureOut">
               <a:rPr lang="en-US" smtClean="0"/>
-              <a:t>4/28/20</a:t>
+              <a:t>5/6/20</a:t>
             </a:fld>
             <a:endParaRPr lang="en-US"/>
           </a:p>
@@ -6649,7 +6649,7 @@
           <a:p>
             <a:fld id="{51673806-0BCD-1F42-BAA8-2011034B3C6A}" type="datetimeFigureOut">
               <a:rPr lang="en-US" smtClean="0"/>
-              <a:t>4/28/20</a:t>
+              <a:t>5/6/20</a:t>
             </a:fld>
             <a:endParaRPr lang="en-US"/>
           </a:p>
@@ -7058,7 +7058,7 @@
           <a:p>
             <a:fld id="{51673806-0BCD-1F42-BAA8-2011034B3C6A}" type="datetimeFigureOut">
               <a:rPr lang="en-US" smtClean="0"/>
-              <a:t>4/28/20</a:t>
+              <a:t>5/6/20</a:t>
             </a:fld>
             <a:endParaRPr lang="en-US"/>
           </a:p>
@@ -7306,7 +7306,7 @@
             <a:fld id="{51673806-0BCD-1F42-BAA8-2011034B3C6A}" type="datetimeFigureOut">
               <a:rPr lang="en-US" smtClean="0"/>
               <a:pPr/>
-              <a:t>4/28/20</a:t>
+              <a:t>5/6/20</a:t>
             </a:fld>
             <a:endParaRPr lang="en-US" dirty="0"/>
           </a:p>
@@ -8056,7 +8056,6 @@
               <a:rPr lang="en-US" dirty="0" smtClean="0"/>
               <a:t>Easily written</a:t>
             </a:r>
-            <a:endParaRPr lang="en-US" dirty="0" smtClean="0"/>
           </a:p>
           <a:p>
             <a:endParaRPr lang="en-US" dirty="0"/>
@@ -8146,7 +8145,6 @@
               <a:rPr lang="en-US" dirty="0" smtClean="0"/>
               <a:t>Difficult to write </a:t>
             </a:r>
-            <a:endParaRPr lang="en-US" dirty="0" smtClean="0"/>
           </a:p>
           <a:p>
             <a:endParaRPr lang="en-US" dirty="0"/>
@@ -8160,7 +8158,6 @@
               <a:rPr lang="en-US" dirty="0"/>
               <a:t> </a:t>
             </a:r>
-            <a:endParaRPr lang="en-US" dirty="0"/>
           </a:p>
         </p:txBody>
       </p:sp>
@@ -8608,11 +8605,15 @@
             </a:r>
             <a:r>
               <a:rPr lang="en-US" b="1" i="1" dirty="0" smtClean="0"/>
-              <a:t>will</a:t>
+              <a:t>are </a:t>
             </a:r>
             <a:r>
               <a:rPr lang="en-US" dirty="0" smtClean="0"/>
-              <a:t> be able to change that</a:t>
+              <a:t>able </a:t>
+            </a:r>
+            <a:r>
+              <a:rPr lang="en-US" dirty="0" smtClean="0"/>
+              <a:t>to change that</a:t>
             </a:r>
           </a:p>
           <a:p>
@@ -8705,15 +8706,27 @@
           <a:p>
             <a:r>
               <a:rPr lang="en-US" dirty="0" smtClean="0"/>
-              <a:t>You have to tell your program that x is an integer, and you will </a:t>
+              <a:t>You have to tell your program that x is an integer, and you </a:t>
             </a:r>
             <a:r>
               <a:rPr lang="en-US" b="1" i="1" dirty="0" smtClean="0"/>
-              <a:t>not</a:t>
+              <a:t>are n</a:t>
+            </a:r>
+            <a:r>
+              <a:rPr lang="en-US" b="1" i="1" dirty="0" smtClean="0"/>
+              <a:t>ot</a:t>
+            </a:r>
+            <a:r>
+              <a:rPr lang="en-US" dirty="0"/>
+              <a:t> </a:t>
             </a:r>
             <a:r>
               <a:rPr lang="en-US" dirty="0" smtClean="0"/>
-              <a:t> be able to change that </a:t>
+              <a:t>able </a:t>
+            </a:r>
+            <a:r>
+              <a:rPr lang="en-US" dirty="0" smtClean="0"/>
+              <a:t>to change that </a:t>
             </a:r>
           </a:p>
           <a:p>

</xml_diff>

<commit_message>
slides: minor edits ; exercises: matplotlib exercise
</commit_message>
<xml_diff>
--- a/slides/context.pptx
+++ b/slides/context.pptx
@@ -396,7 +396,7 @@
           <a:p>
             <a:fld id="{51673806-0BCD-1F42-BAA8-2011034B3C6A}" type="datetimeFigureOut">
               <a:rPr lang="en-US" smtClean="0"/>
-              <a:t>5/6/20</a:t>
+              <a:t>5/11/20</a:t>
             </a:fld>
             <a:endParaRPr lang="en-US"/>
           </a:p>
@@ -810,7 +810,7 @@
           <a:p>
             <a:fld id="{51673806-0BCD-1F42-BAA8-2011034B3C6A}" type="datetimeFigureOut">
               <a:rPr lang="en-US" smtClean="0"/>
-              <a:t>5/6/20</a:t>
+              <a:t>5/11/20</a:t>
             </a:fld>
             <a:endParaRPr lang="en-US"/>
           </a:p>
@@ -1141,7 +1141,7 @@
           <a:p>
             <a:fld id="{51673806-0BCD-1F42-BAA8-2011034B3C6A}" type="datetimeFigureOut">
               <a:rPr lang="en-US" smtClean="0"/>
-              <a:t>5/6/20</a:t>
+              <a:t>5/11/20</a:t>
             </a:fld>
             <a:endParaRPr lang="en-US"/>
           </a:p>
@@ -1541,7 +1541,7 @@
           <a:p>
             <a:fld id="{51673806-0BCD-1F42-BAA8-2011034B3C6A}" type="datetimeFigureOut">
               <a:rPr lang="en-US" smtClean="0"/>
-              <a:t>5/6/20</a:t>
+              <a:t>5/11/20</a:t>
             </a:fld>
             <a:endParaRPr lang="en-US"/>
           </a:p>
@@ -2104,7 +2104,7 @@
           <a:p>
             <a:fld id="{51673806-0BCD-1F42-BAA8-2011034B3C6A}" type="datetimeFigureOut">
               <a:rPr lang="en-US" smtClean="0"/>
-              <a:t>5/6/20</a:t>
+              <a:t>5/11/20</a:t>
             </a:fld>
             <a:endParaRPr lang="en-US"/>
           </a:p>
@@ -2780,7 +2780,7 @@
           <a:p>
             <a:fld id="{51673806-0BCD-1F42-BAA8-2011034B3C6A}" type="datetimeFigureOut">
               <a:rPr lang="en-US" smtClean="0"/>
-              <a:t>5/6/20</a:t>
+              <a:t>5/11/20</a:t>
             </a:fld>
             <a:endParaRPr lang="en-US"/>
           </a:p>
@@ -3688,7 +3688,7 @@
           <a:p>
             <a:fld id="{51673806-0BCD-1F42-BAA8-2011034B3C6A}" type="datetimeFigureOut">
               <a:rPr lang="en-US" smtClean="0"/>
-              <a:t>5/6/20</a:t>
+              <a:t>5/11/20</a:t>
             </a:fld>
             <a:endParaRPr lang="en-US"/>
           </a:p>
@@ -3996,7 +3996,7 @@
           <a:p>
             <a:fld id="{51673806-0BCD-1F42-BAA8-2011034B3C6A}" type="datetimeFigureOut">
               <a:rPr lang="en-US" smtClean="0"/>
-              <a:t>5/6/20</a:t>
+              <a:t>5/11/20</a:t>
             </a:fld>
             <a:endParaRPr lang="en-US"/>
           </a:p>
@@ -4255,7 +4255,7 @@
           <a:p>
             <a:fld id="{51673806-0BCD-1F42-BAA8-2011034B3C6A}" type="datetimeFigureOut">
               <a:rPr lang="en-US" smtClean="0"/>
-              <a:t>5/6/20</a:t>
+              <a:t>5/11/20</a:t>
             </a:fld>
             <a:endParaRPr lang="en-US"/>
           </a:p>
@@ -4578,7 +4578,7 @@
           <a:p>
             <a:fld id="{51673806-0BCD-1F42-BAA8-2011034B3C6A}" type="datetimeFigureOut">
               <a:rPr lang="en-US" smtClean="0"/>
-              <a:t>5/6/20</a:t>
+              <a:t>5/11/20</a:t>
             </a:fld>
             <a:endParaRPr lang="en-US"/>
           </a:p>
@@ -4962,7 +4962,7 @@
           <a:p>
             <a:fld id="{51673806-0BCD-1F42-BAA8-2011034B3C6A}" type="datetimeFigureOut">
               <a:rPr lang="en-US" smtClean="0"/>
-              <a:t>5/6/20</a:t>
+              <a:t>5/11/20</a:t>
             </a:fld>
             <a:endParaRPr lang="en-US"/>
           </a:p>
@@ -5338,7 +5338,7 @@
           <a:p>
             <a:fld id="{51673806-0BCD-1F42-BAA8-2011034B3C6A}" type="datetimeFigureOut">
               <a:rPr lang="en-US" smtClean="0"/>
-              <a:t>5/6/20</a:t>
+              <a:t>5/11/20</a:t>
             </a:fld>
             <a:endParaRPr lang="en-US"/>
           </a:p>
@@ -5844,7 +5844,7 @@
           <a:p>
             <a:fld id="{51673806-0BCD-1F42-BAA8-2011034B3C6A}" type="datetimeFigureOut">
               <a:rPr lang="en-US" smtClean="0"/>
-              <a:t>5/6/20</a:t>
+              <a:t>5/11/20</a:t>
             </a:fld>
             <a:endParaRPr lang="en-US"/>
           </a:p>
@@ -6101,7 +6101,7 @@
           <a:p>
             <a:fld id="{51673806-0BCD-1F42-BAA8-2011034B3C6A}" type="datetimeFigureOut">
               <a:rPr lang="en-US" smtClean="0"/>
-              <a:t>5/6/20</a:t>
+              <a:t>5/11/20</a:t>
             </a:fld>
             <a:endParaRPr lang="en-US"/>
           </a:p>
@@ -6259,7 +6259,7 @@
           <a:p>
             <a:fld id="{51673806-0BCD-1F42-BAA8-2011034B3C6A}" type="datetimeFigureOut">
               <a:rPr lang="en-US" smtClean="0"/>
-              <a:t>5/6/20</a:t>
+              <a:t>5/11/20</a:t>
             </a:fld>
             <a:endParaRPr lang="en-US"/>
           </a:p>
@@ -6649,7 +6649,7 @@
           <a:p>
             <a:fld id="{51673806-0BCD-1F42-BAA8-2011034B3C6A}" type="datetimeFigureOut">
               <a:rPr lang="en-US" smtClean="0"/>
-              <a:t>5/6/20</a:t>
+              <a:t>5/11/20</a:t>
             </a:fld>
             <a:endParaRPr lang="en-US"/>
           </a:p>
@@ -7058,7 +7058,7 @@
           <a:p>
             <a:fld id="{51673806-0BCD-1F42-BAA8-2011034B3C6A}" type="datetimeFigureOut">
               <a:rPr lang="en-US" smtClean="0"/>
-              <a:t>5/6/20</a:t>
+              <a:t>5/11/20</a:t>
             </a:fld>
             <a:endParaRPr lang="en-US"/>
           </a:p>
@@ -7306,7 +7306,7 @@
             <a:fld id="{51673806-0BCD-1F42-BAA8-2011034B3C6A}" type="datetimeFigureOut">
               <a:rPr lang="en-US" smtClean="0"/>
               <a:pPr/>
-              <a:t>5/6/20</a:t>
+              <a:t>5/11/20</a:t>
             </a:fld>
             <a:endParaRPr lang="en-US" dirty="0"/>
           </a:p>
@@ -7931,6 +7931,36 @@
           </a:p>
         </p:txBody>
       </p:sp>
+      <p:pic>
+        <p:nvPicPr>
+          <p:cNvPr id="4" name="Picture 3"/>
+          <p:cNvPicPr>
+            <a:picLocks noChangeAspect="1"/>
+          </p:cNvPicPr>
+          <p:nvPr/>
+        </p:nvPicPr>
+        <p:blipFill>
+          <a:blip r:embed="rId2">
+            <a:extLst>
+              <a:ext uri="{28A0092B-C50C-407E-A947-70E740481C1C}">
+                <a14:useLocalDpi xmlns:a14="http://schemas.microsoft.com/office/drawing/2010/main" val="0"/>
+              </a:ext>
+            </a:extLst>
+          </a:blip>
+          <a:stretch>
+            <a:fillRect/>
+          </a:stretch>
+        </p:blipFill>
+        <p:spPr>
+          <a:xfrm>
+            <a:off x="5390297" y="2975212"/>
+            <a:ext cx="5741082" cy="3588176"/>
+          </a:xfrm>
+          <a:prstGeom prst="rect">
+            <a:avLst/>
+          </a:prstGeom>
+        </p:spPr>
+      </p:pic>
     </p:spTree>
     <p:extLst>
       <p:ext uri="{BB962C8B-B14F-4D97-AF65-F5344CB8AC3E}">
@@ -8257,9 +8287,16 @@
             <p:ph idx="1"/>
           </p:nvPr>
         </p:nvSpPr>
-        <p:spPr/>
-        <p:txBody>
-          <a:bodyPr/>
+        <p:spPr>
+          <a:xfrm>
+            <a:off x="680321" y="2336873"/>
+            <a:ext cx="9613861" cy="4364178"/>
+          </a:xfrm>
+        </p:spPr>
+        <p:txBody>
+          <a:bodyPr>
+            <a:normAutofit/>
+          </a:bodyPr>
           <a:lstStyle/>
           <a:p>
             <a:pPr marL="0" indent="0">
@@ -8274,6 +8311,44 @@
             <a:pPr marL="0" indent="0">
               <a:buNone/>
             </a:pPr>
+            <a:endParaRPr lang="en-US" dirty="0"/>
+          </a:p>
+          <a:p>
+            <a:pPr marL="0" indent="0">
+              <a:buNone/>
+            </a:pPr>
+            <a:r>
+              <a:rPr lang="en-US" dirty="0" smtClean="0"/>
+              <a:t>Written in C*: a compiled language </a:t>
+            </a:r>
+          </a:p>
+          <a:p>
+            <a:pPr lvl="1"/>
+            <a:r>
+              <a:rPr lang="en-US" dirty="0" smtClean="0"/>
+              <a:t>A program which is already in machine language is reading what you write and is deciding what to do based on that </a:t>
+            </a:r>
+            <a:endParaRPr lang="en-US" dirty="0"/>
+          </a:p>
+          <a:p>
+            <a:pPr lvl="1"/>
+            <a:r>
+              <a:rPr lang="en-US" dirty="0" smtClean="0"/>
+              <a:t>If you take on data intensive project(s) and need faster code: this makes getting python and C code to talk to each other </a:t>
+            </a:r>
+            <a:r>
+              <a:rPr lang="en-US" i="1" dirty="0" smtClean="0"/>
+              <a:t>easy</a:t>
+            </a:r>
+            <a:r>
+              <a:rPr lang="en-US" dirty="0" smtClean="0"/>
+              <a:t> </a:t>
+            </a:r>
+          </a:p>
+          <a:p>
+            <a:pPr marL="0" indent="0">
+              <a:buNone/>
+            </a:pPr>
             <a:endParaRPr lang="en-US" dirty="0" smtClean="0"/>
           </a:p>
           <a:p>
@@ -8288,33 +8363,15 @@
             </a:pPr>
             <a:r>
               <a:rPr lang="en-US" dirty="0" smtClean="0"/>
-              <a:t>Written in C: a compiled language </a:t>
-            </a:r>
-          </a:p>
-          <a:p>
-            <a:pPr lvl="1"/>
+              <a:t>*There are other implementations of python, though </a:t>
+            </a:r>
+            <a:r>
+              <a:rPr lang="en-US" dirty="0" err="1" smtClean="0"/>
+              <a:t>CPython</a:t>
+            </a:r>
             <a:r>
               <a:rPr lang="en-US" dirty="0" smtClean="0"/>
-              <a:t>A program which is already in machine language is reading what you write and is deciding what to do based on that </a:t>
-            </a:r>
-          </a:p>
-          <a:p>
-            <a:pPr lvl="1"/>
-            <a:endParaRPr lang="en-US" dirty="0"/>
-          </a:p>
-          <a:p>
-            <a:pPr lvl="1"/>
-            <a:r>
-              <a:rPr lang="en-US" dirty="0" smtClean="0"/>
-              <a:t>If you take on data intensive project(s) and need faster code: this makes getting python and C code to talk to each other </a:t>
-            </a:r>
-            <a:r>
-              <a:rPr lang="en-US" i="1" dirty="0" smtClean="0"/>
-              <a:t>easy</a:t>
-            </a:r>
-            <a:r>
-              <a:rPr lang="en-US" dirty="0" smtClean="0"/>
-              <a:t> </a:t>
+              <a:t> is the standard </a:t>
             </a:r>
           </a:p>
         </p:txBody>
@@ -8609,11 +8666,7 @@
             </a:r>
             <a:r>
               <a:rPr lang="en-US" dirty="0" smtClean="0"/>
-              <a:t>able </a:t>
-            </a:r>
-            <a:r>
-              <a:rPr lang="en-US" dirty="0" smtClean="0"/>
-              <a:t>to change that</a:t>
+              <a:t>able to change that</a:t>
             </a:r>
           </a:p>
           <a:p>
@@ -8710,11 +8763,7 @@
             </a:r>
             <a:r>
               <a:rPr lang="en-US" b="1" i="1" dirty="0" smtClean="0"/>
-              <a:t>are n</a:t>
-            </a:r>
-            <a:r>
-              <a:rPr lang="en-US" b="1" i="1" dirty="0" smtClean="0"/>
-              <a:t>ot</a:t>
+              <a:t>are not</a:t>
             </a:r>
             <a:r>
               <a:rPr lang="en-US" dirty="0"/>
@@ -8722,11 +8771,7 @@
             </a:r>
             <a:r>
               <a:rPr lang="en-US" dirty="0" smtClean="0"/>
-              <a:t>able </a:t>
-            </a:r>
-            <a:r>
-              <a:rPr lang="en-US" dirty="0" smtClean="0"/>
-              <a:t>to change that </a:t>
+              <a:t>able to change that </a:t>
             </a:r>
           </a:p>
           <a:p>

</xml_diff>

<commit_message>
slides: minor slide edits
</commit_message>
<xml_diff>
--- a/slides/context.pptx
+++ b/slides/context.pptx
@@ -267,38 +267,37 @@
           <a:p>
             <a:pPr lvl="0"/>
             <a:r>
-              <a:rPr lang="en-US" smtClean="0"/>
+              <a:rPr lang="en-US"/>
               <a:t>Click to edit Master text styles</a:t>
             </a:r>
           </a:p>
           <a:p>
             <a:pPr lvl="1"/>
             <a:r>
-              <a:rPr lang="en-US" smtClean="0"/>
+              <a:rPr lang="en-US"/>
               <a:t>Second level</a:t>
             </a:r>
           </a:p>
           <a:p>
             <a:pPr lvl="2"/>
             <a:r>
-              <a:rPr lang="en-US" smtClean="0"/>
+              <a:rPr lang="en-US"/>
               <a:t>Third level</a:t>
             </a:r>
           </a:p>
           <a:p>
             <a:pPr lvl="3"/>
             <a:r>
-              <a:rPr lang="en-US" smtClean="0"/>
+              <a:rPr lang="en-US"/>
               <a:t>Fourth level</a:t>
             </a:r>
           </a:p>
           <a:p>
             <a:pPr lvl="4"/>
             <a:r>
-              <a:rPr lang="en-US" smtClean="0"/>
+              <a:rPr lang="en-US"/>
               <a:t>Fifth level</a:t>
             </a:r>
-            <a:endParaRPr lang="en-US"/>
           </a:p>
         </p:txBody>
       </p:sp>
@@ -516,19 +515,19 @@
           <a:lstStyle/>
           <a:p>
             <a:r>
-              <a:rPr lang="en-US" dirty="0" smtClean="0"/>
+              <a:rPr lang="en-US" dirty="0"/>
               <a:t>We’ll come back to this later in the </a:t>
             </a:r>
             <a:r>
-              <a:rPr lang="en-US" dirty="0" err="1" smtClean="0"/>
+              <a:rPr lang="en-US" dirty="0" err="1"/>
               <a:t>bootcamp</a:t>
             </a:r>
             <a:r>
-              <a:rPr lang="en-US" dirty="0" smtClean="0"/>
+              <a:rPr lang="en-US" dirty="0"/>
               <a:t> when we talk</a:t>
             </a:r>
             <a:r>
-              <a:rPr lang="en-US" baseline="0" dirty="0" smtClean="0"/>
+              <a:rPr lang="en-US" baseline="0" dirty="0"/>
               <a:t> about object oriented programming and this should make much more sense then. </a:t>
             </a:r>
             <a:endParaRPr lang="en-US" dirty="0"/>
@@ -758,10 +757,9 @@
           </a:lstStyle>
           <a:p>
             <a:r>
-              <a:rPr lang="en-US" dirty="0" smtClean="0"/>
+              <a:rPr lang="en-US" dirty="0"/>
               <a:t>Click to edit Master title style</a:t>
             </a:r>
-            <a:endParaRPr lang="en-US" dirty="0"/>
           </a:p>
         </p:txBody>
       </p:sp>
@@ -825,10 +823,9 @@
           </a:lstStyle>
           <a:p>
             <a:r>
-              <a:rPr lang="en-US" dirty="0" smtClean="0"/>
+              <a:rPr lang="en-US" dirty="0"/>
               <a:t>Click to edit Master subtitle style</a:t>
             </a:r>
-            <a:endParaRPr lang="en-US" dirty="0"/>
           </a:p>
         </p:txBody>
       </p:sp>
@@ -1098,7 +1095,7 @@
           </a:lstStyle>
           <a:p>
             <a:r>
-              <a:rPr lang="en-US" smtClean="0"/>
+              <a:rPr lang="en-US"/>
               <a:t>Click to edit Master title style</a:t>
             </a:r>
             <a:endParaRPr lang="en-US" dirty="0"/>
@@ -1174,7 +1171,7 @@
           </a:lstStyle>
           <a:p>
             <a:r>
-              <a:rPr lang="en-US" smtClean="0"/>
+              <a:rPr lang="en-US"/>
               <a:t>Drag picture to placeholder or click icon to add</a:t>
             </a:r>
             <a:endParaRPr lang="en-US" dirty="0"/>
@@ -1240,7 +1237,7 @@
           <a:p>
             <a:pPr lvl="0"/>
             <a:r>
-              <a:rPr lang="en-US" smtClean="0"/>
+              <a:rPr lang="en-US"/>
               <a:t>Click to edit Master text styles</a:t>
             </a:r>
           </a:p>
@@ -1505,7 +1502,7 @@
           </a:lstStyle>
           <a:p>
             <a:r>
-              <a:rPr lang="en-US" smtClean="0"/>
+              <a:rPr lang="en-US"/>
               <a:t>Click to edit Master title style</a:t>
             </a:r>
             <a:endParaRPr lang="en-US" dirty="0"/>
@@ -1571,7 +1568,7 @@
           <a:p>
             <a:pPr lvl="0"/>
             <a:r>
-              <a:rPr lang="en-US" smtClean="0"/>
+              <a:rPr lang="en-US"/>
               <a:t>Click to edit Master text styles</a:t>
             </a:r>
           </a:p>
@@ -1836,7 +1833,7 @@
           </a:lstStyle>
           <a:p>
             <a:r>
-              <a:rPr lang="en-US" smtClean="0"/>
+              <a:rPr lang="en-US"/>
               <a:t>Click to edit Master title style</a:t>
             </a:r>
             <a:endParaRPr lang="en-US" dirty="0"/>
@@ -1904,7 +1901,7 @@
           <a:p>
             <a:pPr lvl="0"/>
             <a:r>
-              <a:rPr lang="en-US" smtClean="0"/>
+              <a:rPr lang="en-US"/>
               <a:t>Click to edit Master text styles</a:t>
             </a:r>
           </a:p>
@@ -1971,7 +1968,7 @@
           <a:p>
             <a:pPr lvl="0"/>
             <a:r>
-              <a:rPr lang="en-US" smtClean="0"/>
+              <a:rPr lang="en-US"/>
               <a:t>Click to edit Master text styles</a:t>
             </a:r>
           </a:p>
@@ -2468,7 +2465,7 @@
           </a:lstStyle>
           <a:p>
             <a:r>
-              <a:rPr lang="en-US" smtClean="0"/>
+              <a:rPr lang="en-US"/>
               <a:t>Click to edit Master title style</a:t>
             </a:r>
             <a:endParaRPr lang="en-US" dirty="0"/>
@@ -2534,7 +2531,7 @@
           <a:p>
             <a:pPr lvl="0"/>
             <a:r>
-              <a:rPr lang="en-US" smtClean="0"/>
+              <a:rPr lang="en-US"/>
               <a:t>Click to edit Master text styles</a:t>
             </a:r>
           </a:p>
@@ -2795,7 +2792,7 @@
           <a:lstStyle/>
           <a:p>
             <a:r>
-              <a:rPr lang="en-US" smtClean="0"/>
+              <a:rPr lang="en-US"/>
               <a:t>Click to edit Master title style</a:t>
             </a:r>
             <a:endParaRPr lang="en-US" dirty="0"/>
@@ -2867,7 +2864,7 @@
           <a:p>
             <a:pPr lvl="0"/>
             <a:r>
-              <a:rPr lang="en-US" smtClean="0"/>
+              <a:rPr lang="en-US"/>
               <a:t>Click to edit Master text styles</a:t>
             </a:r>
           </a:p>
@@ -2934,7 +2931,7 @@
           <a:p>
             <a:pPr lvl="0"/>
             <a:r>
-              <a:rPr lang="en-US" smtClean="0"/>
+              <a:rPr lang="en-US"/>
               <a:t>Click to edit Master text styles</a:t>
             </a:r>
           </a:p>
@@ -3005,7 +3002,7 @@
           <a:p>
             <a:pPr lvl="0"/>
             <a:r>
-              <a:rPr lang="en-US" smtClean="0"/>
+              <a:rPr lang="en-US"/>
               <a:t>Click to edit Master text styles</a:t>
             </a:r>
           </a:p>
@@ -3072,7 +3069,7 @@
           <a:p>
             <a:pPr lvl="0"/>
             <a:r>
-              <a:rPr lang="en-US" smtClean="0"/>
+              <a:rPr lang="en-US"/>
               <a:t>Click to edit Master text styles</a:t>
             </a:r>
           </a:p>
@@ -3143,7 +3140,7 @@
           <a:p>
             <a:pPr lvl="0"/>
             <a:r>
-              <a:rPr lang="en-US" smtClean="0"/>
+              <a:rPr lang="en-US"/>
               <a:t>Click to edit Master text styles</a:t>
             </a:r>
           </a:p>
@@ -3210,7 +3207,7 @@
           <a:p>
             <a:pPr lvl="0"/>
             <a:r>
-              <a:rPr lang="en-US" smtClean="0"/>
+              <a:rPr lang="en-US"/>
               <a:t>Click to edit Master text styles</a:t>
             </a:r>
           </a:p>
@@ -3466,7 +3463,7 @@
           <a:lstStyle/>
           <a:p>
             <a:r>
-              <a:rPr lang="en-US" smtClean="0"/>
+              <a:rPr lang="en-US"/>
               <a:t>Click to edit Master title style</a:t>
             </a:r>
             <a:endParaRPr lang="en-US" dirty="0"/>
@@ -3538,7 +3535,7 @@
           <a:p>
             <a:pPr lvl="0"/>
             <a:r>
-              <a:rPr lang="en-US" smtClean="0"/>
+              <a:rPr lang="en-US"/>
               <a:t>Click to edit Master text styles</a:t>
             </a:r>
           </a:p>
@@ -3616,7 +3613,7 @@
           </a:lstStyle>
           <a:p>
             <a:r>
-              <a:rPr lang="en-US" smtClean="0"/>
+              <a:rPr lang="en-US"/>
               <a:t>Drag picture to placeholder or click icon to add</a:t>
             </a:r>
             <a:endParaRPr lang="en-US" dirty="0"/>
@@ -3684,7 +3681,7 @@
           <a:p>
             <a:pPr lvl="0"/>
             <a:r>
-              <a:rPr lang="en-US" smtClean="0"/>
+              <a:rPr lang="en-US"/>
               <a:t>Click to edit Master text styles</a:t>
             </a:r>
           </a:p>
@@ -3755,7 +3752,7 @@
           <a:p>
             <a:pPr lvl="0"/>
             <a:r>
-              <a:rPr lang="en-US" smtClean="0"/>
+              <a:rPr lang="en-US"/>
               <a:t>Click to edit Master text styles</a:t>
             </a:r>
           </a:p>
@@ -3833,7 +3830,7 @@
           </a:lstStyle>
           <a:p>
             <a:r>
-              <a:rPr lang="en-US" smtClean="0"/>
+              <a:rPr lang="en-US"/>
               <a:t>Drag picture to placeholder or click icon to add</a:t>
             </a:r>
             <a:endParaRPr lang="en-US" dirty="0"/>
@@ -3901,7 +3898,7 @@
           <a:p>
             <a:pPr lvl="0"/>
             <a:r>
-              <a:rPr lang="en-US" smtClean="0"/>
+              <a:rPr lang="en-US"/>
               <a:t>Click to edit Master text styles</a:t>
             </a:r>
           </a:p>
@@ -3972,7 +3969,7 @@
           <a:p>
             <a:pPr lvl="0"/>
             <a:r>
-              <a:rPr lang="en-US" smtClean="0"/>
+              <a:rPr lang="en-US"/>
               <a:t>Click to edit Master text styles</a:t>
             </a:r>
           </a:p>
@@ -4050,7 +4047,7 @@
           </a:lstStyle>
           <a:p>
             <a:r>
-              <a:rPr lang="en-US" smtClean="0"/>
+              <a:rPr lang="en-US"/>
               <a:t>Drag picture to placeholder or click icon to add</a:t>
             </a:r>
             <a:endParaRPr lang="en-US" dirty="0"/>
@@ -4118,7 +4115,7 @@
           <a:p>
             <a:pPr lvl="0"/>
             <a:r>
-              <a:rPr lang="en-US" smtClean="0"/>
+              <a:rPr lang="en-US"/>
               <a:t>Click to edit Master text styles</a:t>
             </a:r>
           </a:p>
@@ -4373,7 +4370,7 @@
           </a:lstStyle>
           <a:p>
             <a:r>
-              <a:rPr lang="en-US" smtClean="0"/>
+              <a:rPr lang="en-US"/>
               <a:t>Click to edit Master title style</a:t>
             </a:r>
             <a:endParaRPr lang="en-US" dirty="0"/>
@@ -4397,35 +4394,35 @@
           <a:p>
             <a:pPr lvl="0"/>
             <a:r>
-              <a:rPr lang="en-US" smtClean="0"/>
+              <a:rPr lang="en-US"/>
               <a:t>Click to edit Master text styles</a:t>
             </a:r>
           </a:p>
           <a:p>
             <a:pPr lvl="1"/>
             <a:r>
-              <a:rPr lang="en-US" smtClean="0"/>
+              <a:rPr lang="en-US"/>
               <a:t>Second level</a:t>
             </a:r>
           </a:p>
           <a:p>
             <a:pPr lvl="2"/>
             <a:r>
-              <a:rPr lang="en-US" smtClean="0"/>
+              <a:rPr lang="en-US"/>
               <a:t>Third level</a:t>
             </a:r>
           </a:p>
           <a:p>
             <a:pPr lvl="3"/>
             <a:r>
-              <a:rPr lang="en-US" smtClean="0"/>
+              <a:rPr lang="en-US"/>
               <a:t>Fourth level</a:t>
             </a:r>
           </a:p>
           <a:p>
             <a:pPr lvl="4"/>
             <a:r>
-              <a:rPr lang="en-US" smtClean="0"/>
+              <a:rPr lang="en-US"/>
               <a:t>Fifth level</a:t>
             </a:r>
             <a:endParaRPr lang="en-US" dirty="0"/>
@@ -4622,7 +4619,7 @@
           <a:lstStyle/>
           <a:p>
             <a:r>
-              <a:rPr lang="en-US" smtClean="0"/>
+              <a:rPr lang="en-US"/>
               <a:t>Click to edit Master title style</a:t>
             </a:r>
             <a:endParaRPr lang="en-US" dirty="0"/>
@@ -4651,35 +4648,35 @@
           <a:p>
             <a:pPr lvl="0"/>
             <a:r>
-              <a:rPr lang="en-US" smtClean="0"/>
+              <a:rPr lang="en-US"/>
               <a:t>Click to edit Master text styles</a:t>
             </a:r>
           </a:p>
           <a:p>
             <a:pPr lvl="1"/>
             <a:r>
-              <a:rPr lang="en-US" smtClean="0"/>
+              <a:rPr lang="en-US"/>
               <a:t>Second level</a:t>
             </a:r>
           </a:p>
           <a:p>
             <a:pPr lvl="2"/>
             <a:r>
-              <a:rPr lang="en-US" smtClean="0"/>
+              <a:rPr lang="en-US"/>
               <a:t>Third level</a:t>
             </a:r>
           </a:p>
           <a:p>
             <a:pPr lvl="3"/>
             <a:r>
-              <a:rPr lang="en-US" smtClean="0"/>
+              <a:rPr lang="en-US"/>
               <a:t>Fourth level</a:t>
             </a:r>
           </a:p>
           <a:p>
             <a:pPr lvl="4"/>
             <a:r>
-              <a:rPr lang="en-US" smtClean="0"/>
+              <a:rPr lang="en-US"/>
               <a:t>Fifth level</a:t>
             </a:r>
             <a:endParaRPr lang="en-US" dirty="0"/>
@@ -4955,7 +4952,7 @@
           <a:lstStyle/>
           <a:p>
             <a:r>
-              <a:rPr lang="en-US" smtClean="0"/>
+              <a:rPr lang="en-US"/>
               <a:t>Click to edit Master title style</a:t>
             </a:r>
             <a:endParaRPr lang="en-US" dirty="0"/>
@@ -4979,35 +4976,35 @@
           <a:p>
             <a:pPr lvl="0"/>
             <a:r>
-              <a:rPr lang="en-US" smtClean="0"/>
+              <a:rPr lang="en-US"/>
               <a:t>Click to edit Master text styles</a:t>
             </a:r>
           </a:p>
           <a:p>
             <a:pPr lvl="1"/>
             <a:r>
-              <a:rPr lang="en-US" smtClean="0"/>
+              <a:rPr lang="en-US"/>
               <a:t>Second level</a:t>
             </a:r>
           </a:p>
           <a:p>
             <a:pPr lvl="2"/>
             <a:r>
-              <a:rPr lang="en-US" smtClean="0"/>
+              <a:rPr lang="en-US"/>
               <a:t>Third level</a:t>
             </a:r>
           </a:p>
           <a:p>
             <a:pPr lvl="3"/>
             <a:r>
-              <a:rPr lang="en-US" smtClean="0"/>
+              <a:rPr lang="en-US"/>
               <a:t>Fourth level</a:t>
             </a:r>
           </a:p>
           <a:p>
             <a:pPr lvl="4"/>
             <a:r>
-              <a:rPr lang="en-US" smtClean="0"/>
+              <a:rPr lang="en-US"/>
               <a:t>Fifth level</a:t>
             </a:r>
             <a:endParaRPr lang="en-US" dirty="0"/>
@@ -5270,7 +5267,7 @@
           </a:lstStyle>
           <a:p>
             <a:r>
-              <a:rPr lang="en-US" smtClean="0"/>
+              <a:rPr lang="en-US"/>
               <a:t>Click to edit Master title style</a:t>
             </a:r>
             <a:endParaRPr lang="en-US" dirty="0"/>
@@ -5392,7 +5389,7 @@
           <a:p>
             <a:pPr lvl="0"/>
             <a:r>
-              <a:rPr lang="en-US" smtClean="0"/>
+              <a:rPr lang="en-US"/>
               <a:t>Click to edit Master text styles</a:t>
             </a:r>
           </a:p>
@@ -5653,7 +5650,7 @@
           <a:lstStyle/>
           <a:p>
             <a:r>
-              <a:rPr lang="en-US" smtClean="0"/>
+              <a:rPr lang="en-US"/>
               <a:t>Click to edit Master title style</a:t>
             </a:r>
             <a:endParaRPr lang="en-US" dirty="0"/>
@@ -5682,35 +5679,35 @@
           <a:p>
             <a:pPr lvl="0"/>
             <a:r>
-              <a:rPr lang="en-US" smtClean="0"/>
+              <a:rPr lang="en-US"/>
               <a:t>Click to edit Master text styles</a:t>
             </a:r>
           </a:p>
           <a:p>
             <a:pPr lvl="1"/>
             <a:r>
-              <a:rPr lang="en-US" smtClean="0"/>
+              <a:rPr lang="en-US"/>
               <a:t>Second level</a:t>
             </a:r>
           </a:p>
           <a:p>
             <a:pPr lvl="2"/>
             <a:r>
-              <a:rPr lang="en-US" smtClean="0"/>
+              <a:rPr lang="en-US"/>
               <a:t>Third level</a:t>
             </a:r>
           </a:p>
           <a:p>
             <a:pPr lvl="3"/>
             <a:r>
-              <a:rPr lang="en-US" smtClean="0"/>
+              <a:rPr lang="en-US"/>
               <a:t>Fourth level</a:t>
             </a:r>
           </a:p>
           <a:p>
             <a:pPr lvl="4"/>
             <a:r>
-              <a:rPr lang="en-US" smtClean="0"/>
+              <a:rPr lang="en-US"/>
               <a:t>Fifth level</a:t>
             </a:r>
             <a:endParaRPr lang="en-US" dirty="0"/>
@@ -5739,35 +5736,35 @@
           <a:p>
             <a:pPr lvl="0"/>
             <a:r>
-              <a:rPr lang="en-US" smtClean="0"/>
+              <a:rPr lang="en-US"/>
               <a:t>Click to edit Master text styles</a:t>
             </a:r>
           </a:p>
           <a:p>
             <a:pPr lvl="1"/>
             <a:r>
-              <a:rPr lang="en-US" smtClean="0"/>
+              <a:rPr lang="en-US"/>
               <a:t>Second level</a:t>
             </a:r>
           </a:p>
           <a:p>
             <a:pPr lvl="2"/>
             <a:r>
-              <a:rPr lang="en-US" smtClean="0"/>
+              <a:rPr lang="en-US"/>
               <a:t>Third level</a:t>
             </a:r>
           </a:p>
           <a:p>
             <a:pPr lvl="3"/>
             <a:r>
-              <a:rPr lang="en-US" smtClean="0"/>
+              <a:rPr lang="en-US"/>
               <a:t>Fourth level</a:t>
             </a:r>
           </a:p>
           <a:p>
             <a:pPr lvl="4"/>
             <a:r>
-              <a:rPr lang="en-US" smtClean="0"/>
+              <a:rPr lang="en-US"/>
               <a:t>Fifth level</a:t>
             </a:r>
             <a:endParaRPr lang="en-US" dirty="0"/>
@@ -6029,7 +6026,7 @@
           <a:lstStyle/>
           <a:p>
             <a:r>
-              <a:rPr lang="en-US" smtClean="0"/>
+              <a:rPr lang="en-US"/>
               <a:t>Click to edit Master title style</a:t>
             </a:r>
             <a:endParaRPr lang="en-US" dirty="0"/>
@@ -6095,7 +6092,7 @@
           <a:p>
             <a:pPr lvl="0"/>
             <a:r>
-              <a:rPr lang="en-US" smtClean="0"/>
+              <a:rPr lang="en-US"/>
               <a:t>Click to edit Master text styles</a:t>
             </a:r>
           </a:p>
@@ -6123,35 +6120,35 @@
           <a:p>
             <a:pPr lvl="0"/>
             <a:r>
-              <a:rPr lang="en-US" smtClean="0"/>
+              <a:rPr lang="en-US"/>
               <a:t>Click to edit Master text styles</a:t>
             </a:r>
           </a:p>
           <a:p>
             <a:pPr lvl="1"/>
             <a:r>
-              <a:rPr lang="en-US" smtClean="0"/>
+              <a:rPr lang="en-US"/>
               <a:t>Second level</a:t>
             </a:r>
           </a:p>
           <a:p>
             <a:pPr lvl="2"/>
             <a:r>
-              <a:rPr lang="en-US" smtClean="0"/>
+              <a:rPr lang="en-US"/>
               <a:t>Third level</a:t>
             </a:r>
           </a:p>
           <a:p>
             <a:pPr lvl="3"/>
             <a:r>
-              <a:rPr lang="en-US" smtClean="0"/>
+              <a:rPr lang="en-US"/>
               <a:t>Fourth level</a:t>
             </a:r>
           </a:p>
           <a:p>
             <a:pPr lvl="4"/>
             <a:r>
-              <a:rPr lang="en-US" smtClean="0"/>
+              <a:rPr lang="en-US"/>
               <a:t>Fifth level</a:t>
             </a:r>
             <a:endParaRPr lang="en-US" dirty="0"/>
@@ -6217,7 +6214,7 @@
           <a:p>
             <a:pPr lvl="0"/>
             <a:r>
-              <a:rPr lang="en-US" smtClean="0"/>
+              <a:rPr lang="en-US"/>
               <a:t>Click to edit Master text styles</a:t>
             </a:r>
           </a:p>
@@ -6245,35 +6242,35 @@
           <a:p>
             <a:pPr lvl="0"/>
             <a:r>
-              <a:rPr lang="en-US" smtClean="0"/>
+              <a:rPr lang="en-US"/>
               <a:t>Click to edit Master text styles</a:t>
             </a:r>
           </a:p>
           <a:p>
             <a:pPr lvl="1"/>
             <a:r>
-              <a:rPr lang="en-US" smtClean="0"/>
+              <a:rPr lang="en-US"/>
               <a:t>Second level</a:t>
             </a:r>
           </a:p>
           <a:p>
             <a:pPr lvl="2"/>
             <a:r>
-              <a:rPr lang="en-US" smtClean="0"/>
+              <a:rPr lang="en-US"/>
               <a:t>Third level</a:t>
             </a:r>
           </a:p>
           <a:p>
             <a:pPr lvl="3"/>
             <a:r>
-              <a:rPr lang="en-US" smtClean="0"/>
+              <a:rPr lang="en-US"/>
               <a:t>Fourth level</a:t>
             </a:r>
           </a:p>
           <a:p>
             <a:pPr lvl="4"/>
             <a:r>
-              <a:rPr lang="en-US" smtClean="0"/>
+              <a:rPr lang="en-US"/>
               <a:t>Fifth level</a:t>
             </a:r>
             <a:endParaRPr lang="en-US" dirty="0"/>
@@ -6530,7 +6527,7 @@
           <a:lstStyle/>
           <a:p>
             <a:r>
-              <a:rPr lang="en-US" smtClean="0"/>
+              <a:rPr lang="en-US"/>
               <a:t>Click to edit Master title style</a:t>
             </a:r>
             <a:endParaRPr lang="en-US" dirty="0"/>
@@ -6956,7 +6953,7 @@
           </a:lstStyle>
           <a:p>
             <a:r>
-              <a:rPr lang="en-US" smtClean="0"/>
+              <a:rPr lang="en-US"/>
               <a:t>Click to edit Master title style</a:t>
             </a:r>
             <a:endParaRPr lang="en-US" dirty="0"/>
@@ -6985,35 +6982,35 @@
           <a:p>
             <a:pPr lvl="0"/>
             <a:r>
-              <a:rPr lang="en-US" smtClean="0"/>
+              <a:rPr lang="en-US"/>
               <a:t>Click to edit Master text styles</a:t>
             </a:r>
           </a:p>
           <a:p>
             <a:pPr lvl="1"/>
             <a:r>
-              <a:rPr lang="en-US" smtClean="0"/>
+              <a:rPr lang="en-US"/>
               <a:t>Second level</a:t>
             </a:r>
           </a:p>
           <a:p>
             <a:pPr lvl="2"/>
             <a:r>
-              <a:rPr lang="en-US" smtClean="0"/>
+              <a:rPr lang="en-US"/>
               <a:t>Third level</a:t>
             </a:r>
           </a:p>
           <a:p>
             <a:pPr lvl="3"/>
             <a:r>
-              <a:rPr lang="en-US" smtClean="0"/>
+              <a:rPr lang="en-US"/>
               <a:t>Fourth level</a:t>
             </a:r>
           </a:p>
           <a:p>
             <a:pPr lvl="4"/>
             <a:r>
-              <a:rPr lang="en-US" smtClean="0"/>
+              <a:rPr lang="en-US"/>
               <a:t>Fifth level</a:t>
             </a:r>
             <a:endParaRPr lang="en-US" dirty="0"/>
@@ -7079,7 +7076,7 @@
           <a:p>
             <a:pPr lvl="0"/>
             <a:r>
-              <a:rPr lang="en-US" smtClean="0"/>
+              <a:rPr lang="en-US"/>
               <a:t>Click to edit Master text styles</a:t>
             </a:r>
           </a:p>
@@ -7346,7 +7343,7 @@
           </a:lstStyle>
           <a:p>
             <a:r>
-              <a:rPr lang="en-US" smtClean="0"/>
+              <a:rPr lang="en-US"/>
               <a:t>Click to edit Master title style</a:t>
             </a:r>
             <a:endParaRPr lang="en-US" dirty="0"/>
@@ -7422,7 +7419,7 @@
           </a:lstStyle>
           <a:p>
             <a:r>
-              <a:rPr lang="en-US" smtClean="0"/>
+              <a:rPr lang="en-US"/>
               <a:t>Drag picture to placeholder or click icon to add</a:t>
             </a:r>
             <a:endParaRPr lang="en-US" dirty="0"/>
@@ -7488,7 +7485,7 @@
           <a:p>
             <a:pPr lvl="0"/>
             <a:r>
-              <a:rPr lang="en-US" smtClean="0"/>
+              <a:rPr lang="en-US"/>
               <a:t>Click to edit Master text styles</a:t>
             </a:r>
           </a:p>
@@ -7533,7 +7530,7 @@
           <a:lstStyle/>
           <a:p>
             <a:r>
-              <a:rPr lang="en-US" smtClean="0"/>
+              <a:rPr lang="en-US"/>
               <a:t>
               </a:t>
             </a:r>
@@ -7651,10 +7648,9 @@
           <a:lstStyle/>
           <a:p>
             <a:r>
-              <a:rPr lang="en-US" dirty="0" smtClean="0"/>
+              <a:rPr lang="en-US" dirty="0"/>
               <a:t>Click to edit Master title style</a:t>
             </a:r>
-            <a:endParaRPr lang="en-US" dirty="0"/>
           </a:p>
         </p:txBody>
       </p:sp>
@@ -7685,38 +7681,37 @@
           <a:p>
             <a:pPr lvl="0"/>
             <a:r>
-              <a:rPr lang="en-US" dirty="0" smtClean="0"/>
+              <a:rPr lang="en-US" dirty="0"/>
               <a:t>Click to edit Master text styles</a:t>
             </a:r>
           </a:p>
           <a:p>
             <a:pPr lvl="1"/>
             <a:r>
-              <a:rPr lang="en-US" dirty="0" smtClean="0"/>
+              <a:rPr lang="en-US" dirty="0"/>
               <a:t>Second level</a:t>
             </a:r>
           </a:p>
           <a:p>
             <a:pPr lvl="2"/>
             <a:r>
-              <a:rPr lang="en-US" dirty="0" smtClean="0"/>
+              <a:rPr lang="en-US" dirty="0"/>
               <a:t>Third level</a:t>
             </a:r>
           </a:p>
           <a:p>
             <a:pPr lvl="3"/>
             <a:r>
-              <a:rPr lang="en-US" dirty="0" smtClean="0"/>
+              <a:rPr lang="en-US" dirty="0"/>
               <a:t>Fourth level</a:t>
             </a:r>
           </a:p>
           <a:p>
             <a:pPr lvl="4"/>
             <a:r>
-              <a:rPr lang="en-US" dirty="0" smtClean="0"/>
+              <a:rPr lang="en-US" dirty="0"/>
               <a:t>Fifth level</a:t>
             </a:r>
-            <a:endParaRPr lang="en-US" dirty="0"/>
           </a:p>
         </p:txBody>
       </p:sp>
@@ -8203,7 +8198,7 @@
           <a:lstStyle/>
           <a:p>
             <a:r>
-              <a:rPr lang="en-US" smtClean="0"/>
+              <a:rPr lang="en-US"/>
               <a:t>The Context of Python</a:t>
             </a:r>
             <a:endParaRPr lang="en-US" dirty="0"/>
@@ -8228,26 +8223,25 @@
           <a:lstStyle/>
           <a:p>
             <a:r>
-              <a:rPr lang="en-US" smtClean="0"/>
+              <a:rPr lang="en-US"/>
               <a:t>SURP 2021 </a:t>
             </a:r>
             <a:r>
-              <a:rPr lang="en-US" dirty="0" smtClean="0"/>
+              <a:rPr lang="en-US" dirty="0"/>
               <a:t>Python Bootcamp</a:t>
             </a:r>
           </a:p>
           <a:p>
             <a:r>
-              <a:rPr lang="en-US" dirty="0" smtClean="0"/>
+              <a:rPr lang="en-US" dirty="0"/>
               <a:t>Ohio State Astronomy </a:t>
             </a:r>
           </a:p>
           <a:p>
             <a:r>
-              <a:rPr lang="en-US" dirty="0" smtClean="0"/>
+              <a:rPr lang="en-US" dirty="0"/>
               <a:t>Slides by: James W. Johnson</a:t>
             </a:r>
-            <a:endParaRPr lang="en-US" dirty="0"/>
           </a:p>
         </p:txBody>
       </p:sp>
@@ -8297,10 +8291,9 @@
           <a:lstStyle/>
           <a:p>
             <a:r>
-              <a:rPr lang="en-US" dirty="0" smtClean="0"/>
+              <a:rPr lang="en-US" dirty="0"/>
               <a:t>Objectives </a:t>
             </a:r>
-            <a:endParaRPr lang="en-US" dirty="0"/>
           </a:p>
         </p:txBody>
       </p:sp>
@@ -8328,16 +8321,8 @@
               <a:buNone/>
             </a:pPr>
             <a:r>
-              <a:rPr lang="en-US" dirty="0" smtClean="0"/>
-              <a:t>Python in Comparison to Other </a:t>
-            </a:r>
-            <a:r>
               <a:rPr lang="en-US" dirty="0"/>
-              <a:t>L</a:t>
-            </a:r>
-            <a:r>
-              <a:rPr lang="en-US" dirty="0" smtClean="0"/>
-              <a:t>anguages </a:t>
+              <a:t>Python in Comparison to Other Languages </a:t>
             </a:r>
           </a:p>
           <a:p>
@@ -8351,7 +8336,7 @@
               <a:buNone/>
             </a:pPr>
             <a:r>
-              <a:rPr lang="en-US" dirty="0" smtClean="0"/>
+              <a:rPr lang="en-US" dirty="0"/>
               <a:t>The Python Interpreter </a:t>
             </a:r>
           </a:p>
@@ -8366,7 +8351,7 @@
               <a:buNone/>
             </a:pPr>
             <a:r>
-              <a:rPr lang="en-US" dirty="0" smtClean="0"/>
+              <a:rPr lang="en-US" dirty="0"/>
               <a:t>The Python Model </a:t>
             </a:r>
           </a:p>
@@ -8381,10 +8366,9 @@
               <a:buNone/>
             </a:pPr>
             <a:r>
-              <a:rPr lang="en-US" dirty="0" smtClean="0"/>
+              <a:rPr lang="en-US" dirty="0"/>
               <a:t>Weak vs. Strong Typing </a:t>
             </a:r>
-            <a:endParaRPr lang="en-US" dirty="0"/>
           </a:p>
         </p:txBody>
       </p:sp>
@@ -8464,10 +8448,9 @@
           <a:lstStyle/>
           <a:p>
             <a:r>
-              <a:rPr lang="en-US" dirty="0" smtClean="0"/>
+              <a:rPr lang="en-US" dirty="0"/>
               <a:t>Python in the Context of Coding Languages</a:t>
             </a:r>
-            <a:endParaRPr lang="en-US" dirty="0"/>
           </a:p>
         </p:txBody>
       </p:sp>
@@ -8487,18 +8470,17 @@
           <a:lstStyle/>
           <a:p>
             <a:r>
-              <a:rPr lang="en-US" dirty="0" smtClean="0"/>
+              <a:rPr lang="en-US" dirty="0"/>
               <a:t>Python: an </a:t>
             </a:r>
             <a:r>
-              <a:rPr lang="en-US" i="1" dirty="0" smtClean="0"/>
+              <a:rPr lang="en-US" i="1" dirty="0"/>
               <a:t>interpreted </a:t>
             </a:r>
             <a:r>
-              <a:rPr lang="en-US" dirty="0" smtClean="0"/>
+              <a:rPr lang="en-US" dirty="0"/>
               <a:t>language</a:t>
             </a:r>
-            <a:endParaRPr lang="en-US" dirty="0"/>
           </a:p>
         </p:txBody>
       </p:sp>
@@ -8523,40 +8505,35 @@
           <a:lstStyle/>
           <a:p>
             <a:r>
-              <a:rPr lang="en-US" dirty="0" smtClean="0"/>
+              <a:rPr lang="en-US" dirty="0"/>
               <a:t>Programs are “translated” to machine language </a:t>
             </a:r>
             <a:r>
-              <a:rPr lang="en-US" i="1" dirty="0" smtClean="0"/>
+              <a:rPr lang="en-US" i="1" dirty="0"/>
               <a:t>as they run</a:t>
-            </a:r>
-            <a:r>
-              <a:rPr lang="en-US" dirty="0" smtClean="0"/>
-              <a:t> </a:t>
-            </a:r>
-          </a:p>
-          <a:p>
-            <a:endParaRPr lang="en-US" dirty="0"/>
-          </a:p>
-          <a:p>
-            <a:r>
-              <a:rPr lang="en-US" dirty="0" smtClean="0"/>
-              <a:t>Easily written</a:t>
-            </a:r>
-          </a:p>
-          <a:p>
-            <a:endParaRPr lang="en-US" dirty="0"/>
-          </a:p>
-          <a:p>
-            <a:r>
-              <a:rPr lang="en-US" dirty="0" smtClean="0"/>
-              <a:t>Slow</a:t>
             </a:r>
             <a:r>
               <a:rPr lang="en-US" dirty="0"/>
               <a:t> </a:t>
             </a:r>
-            <a:endParaRPr lang="en-US" dirty="0" smtClean="0"/>
+          </a:p>
+          <a:p>
+            <a:endParaRPr lang="en-US" dirty="0"/>
+          </a:p>
+          <a:p>
+            <a:r>
+              <a:rPr lang="en-US" dirty="0"/>
+              <a:t>Easily written</a:t>
+            </a:r>
+          </a:p>
+          <a:p>
+            <a:endParaRPr lang="en-US" dirty="0"/>
+          </a:p>
+          <a:p>
+            <a:r>
+              <a:rPr lang="en-US" dirty="0"/>
+              <a:t>Slow </a:t>
+            </a:r>
           </a:p>
         </p:txBody>
       </p:sp>
@@ -8576,18 +8553,17 @@
           <a:lstStyle/>
           <a:p>
             <a:r>
-              <a:rPr lang="en-US" dirty="0" smtClean="0"/>
+              <a:rPr lang="en-US" dirty="0"/>
               <a:t>C/C++: a </a:t>
             </a:r>
             <a:r>
-              <a:rPr lang="en-US" i="1" dirty="0" smtClean="0"/>
+              <a:rPr lang="en-US" i="1" dirty="0"/>
               <a:t>compiled</a:t>
             </a:r>
             <a:r>
-              <a:rPr lang="en-US" dirty="0" smtClean="0"/>
+              <a:rPr lang="en-US" dirty="0"/>
               <a:t> language </a:t>
             </a:r>
-            <a:endParaRPr lang="en-US" dirty="0"/>
           </a:p>
         </p:txBody>
       </p:sp>
@@ -8612,15 +8588,15 @@
           <a:lstStyle/>
           <a:p>
             <a:r>
-              <a:rPr lang="en-US" dirty="0" smtClean="0"/>
+              <a:rPr lang="en-US" dirty="0"/>
               <a:t>Programs are “translated” to machine language, and </a:t>
             </a:r>
             <a:r>
-              <a:rPr lang="en-US" i="1" dirty="0" smtClean="0"/>
+              <a:rPr lang="en-US" i="1" dirty="0"/>
               <a:t>then</a:t>
             </a:r>
             <a:r>
-              <a:rPr lang="en-US" dirty="0" smtClean="0"/>
+              <a:rPr lang="en-US" dirty="0"/>
               <a:t> ran</a:t>
             </a:r>
           </a:p>
@@ -8629,7 +8605,7 @@
           </a:p>
           <a:p>
             <a:r>
-              <a:rPr lang="en-US" dirty="0" smtClean="0"/>
+              <a:rPr lang="en-US" dirty="0"/>
               <a:t>Difficult to write </a:t>
             </a:r>
           </a:p>
@@ -8638,12 +8614,8 @@
           </a:p>
           <a:p>
             <a:r>
-              <a:rPr lang="en-US" dirty="0" smtClean="0"/>
-              <a:t>Fast</a:t>
-            </a:r>
-            <a:r>
               <a:rPr lang="en-US" dirty="0"/>
-              <a:t> </a:t>
+              <a:t>Fast </a:t>
             </a:r>
           </a:p>
         </p:txBody>
@@ -8671,7 +8643,7 @@
           <a:lstStyle/>
           <a:p>
             <a:r>
-              <a:rPr lang="en-US" sz="2400" dirty="0" smtClean="0">
+              <a:rPr lang="en-US" sz="2400" dirty="0">
                 <a:latin typeface="Times New Roman" charset="0"/>
                 <a:ea typeface="Times New Roman" charset="0"/>
                 <a:cs typeface="Times New Roman" charset="0"/>
@@ -8727,10 +8699,9 @@
           <a:lstStyle/>
           <a:p>
             <a:r>
-              <a:rPr lang="en-US" dirty="0" smtClean="0"/>
+              <a:rPr lang="en-US" dirty="0"/>
               <a:t>The Python Interpreter </a:t>
             </a:r>
-            <a:endParaRPr lang="en-US" dirty="0"/>
           </a:p>
         </p:txBody>
       </p:sp>
@@ -8760,7 +8731,7 @@
               <a:buNone/>
             </a:pPr>
             <a:r>
-              <a:rPr lang="en-US" dirty="0" smtClean="0"/>
+              <a:rPr lang="en-US" dirty="0"/>
               <a:t>The program which reads and runs code written in python </a:t>
             </a:r>
           </a:p>
@@ -8775,38 +8746,31 @@
               <a:buNone/>
             </a:pPr>
             <a:r>
-              <a:rPr lang="en-US" dirty="0" smtClean="0"/>
+              <a:rPr lang="en-US" dirty="0"/>
               <a:t>Written in C*: a compiled language </a:t>
             </a:r>
           </a:p>
           <a:p>
             <a:pPr lvl="1"/>
             <a:r>
-              <a:rPr lang="en-US" dirty="0" smtClean="0"/>
+              <a:rPr lang="en-US" dirty="0"/>
               <a:t>A program which is already in machine language is reading what you write and is deciding what to do based on that </a:t>
             </a:r>
-            <a:endParaRPr lang="en-US" dirty="0"/>
           </a:p>
           <a:p>
             <a:pPr lvl="1"/>
             <a:r>
-              <a:rPr lang="en-US" dirty="0" smtClean="0"/>
+              <a:rPr lang="en-US" dirty="0"/>
               <a:t>If you take on data intensive project(s) and need faster code: this makes getting python and C code to talk to each other </a:t>
             </a:r>
             <a:r>
-              <a:rPr lang="en-US" i="1" dirty="0" smtClean="0"/>
+              <a:rPr lang="en-US" i="1" dirty="0"/>
               <a:t>easy</a:t>
             </a:r>
             <a:r>
-              <a:rPr lang="en-US" dirty="0" smtClean="0"/>
+              <a:rPr lang="en-US" dirty="0"/>
               <a:t> </a:t>
             </a:r>
-          </a:p>
-          <a:p>
-            <a:pPr marL="0" indent="0">
-              <a:buNone/>
-            </a:pPr>
-            <a:endParaRPr lang="en-US" dirty="0" smtClean="0"/>
           </a:p>
           <a:p>
             <a:pPr marL="0" indent="0">
@@ -8818,24 +8782,22 @@
             <a:pPr marL="0" indent="0">
               <a:buNone/>
             </a:pPr>
-            <a:r>
-              <a:rPr lang="en-US" dirty="0" smtClean="0"/>
-              <a:t>*There are other implementations of </a:t>
-            </a:r>
+            <a:endParaRPr lang="en-US" dirty="0"/>
+          </a:p>
+          <a:p>
+            <a:pPr marL="0" indent="0">
+              <a:buNone/>
+            </a:pPr>
             <a:r>
               <a:rPr lang="en-US" dirty="0"/>
-              <a:t>P</a:t>
-            </a:r>
-            <a:r>
-              <a:rPr lang="en-US" dirty="0" smtClean="0"/>
-              <a:t>ython, though </a:t>
-            </a:r>
-            <a:r>
-              <a:rPr lang="en-US" dirty="0" err="1" smtClean="0"/>
+              <a:t>*There are other implementations of Python, though </a:t>
+            </a:r>
+            <a:r>
+              <a:rPr lang="en-US" dirty="0" err="1"/>
               <a:t>CPython</a:t>
             </a:r>
             <a:r>
-              <a:rPr lang="en-US" dirty="0" smtClean="0"/>
+              <a:rPr lang="en-US" dirty="0"/>
               <a:t> is the standard </a:t>
             </a:r>
           </a:p>
@@ -8887,10 +8849,9 @@
           <a:lstStyle/>
           <a:p>
             <a:r>
-              <a:rPr lang="en-US" dirty="0" smtClean="0"/>
+              <a:rPr lang="en-US" dirty="0"/>
               <a:t>The Python Model: Everything is an Object </a:t>
             </a:r>
-            <a:endParaRPr lang="en-US" dirty="0"/>
           </a:p>
         </p:txBody>
       </p:sp>
@@ -8918,22 +8879,22 @@
               <a:buNone/>
             </a:pPr>
             <a:r>
-              <a:rPr lang="en-US" dirty="0" smtClean="0"/>
+              <a:rPr lang="en-US" dirty="0"/>
               <a:t>No – </a:t>
             </a:r>
             <a:r>
-              <a:rPr lang="en-US" b="1" i="1" dirty="0" smtClean="0"/>
+              <a:rPr lang="en-US" b="1" i="1" dirty="0"/>
               <a:t>really</a:t>
             </a:r>
             <a:r>
-              <a:rPr lang="en-US" dirty="0" smtClean="0"/>
+              <a:rPr lang="en-US" dirty="0"/>
               <a:t> – everything</a:t>
             </a:r>
           </a:p>
           <a:p>
             <a:pPr lvl="1"/>
             <a:r>
-              <a:rPr lang="en-US" dirty="0" smtClean="0"/>
+              <a:rPr lang="en-US" dirty="0"/>
               <a:t>This is part of what makes python a slower language </a:t>
             </a:r>
           </a:p>
@@ -8945,27 +8906,23 @@
               <a:buNone/>
             </a:pPr>
             <a:r>
-              <a:rPr lang="en-US" dirty="0" smtClean="0"/>
+              <a:rPr lang="en-US" dirty="0"/>
               <a:t>Objects in programming – anything with attributes and functionality </a:t>
             </a:r>
           </a:p>
           <a:p>
             <a:pPr lvl="1"/>
             <a:r>
-              <a:rPr lang="en-US" dirty="0" smtClean="0"/>
+              <a:rPr lang="en-US" dirty="0"/>
               <a:t>Python interpreter implements the </a:t>
             </a:r>
             <a:r>
-              <a:rPr lang="en-US" dirty="0" err="1" smtClean="0"/>
+              <a:rPr lang="en-US" dirty="0" err="1"/>
               <a:t>PyObject</a:t>
             </a:r>
             <a:r>
               <a:rPr lang="en-US" dirty="0"/>
-              <a:t> </a:t>
-            </a:r>
-            <a:r>
-              <a:rPr lang="en-US" dirty="0" smtClean="0"/>
-              <a:t>under the hood </a:t>
+              <a:t> under the hood </a:t>
             </a:r>
           </a:p>
           <a:p>
@@ -8976,28 +8933,28 @@
               <a:buNone/>
             </a:pPr>
             <a:r>
-              <a:rPr lang="en-US" dirty="0" smtClean="0"/>
+              <a:rPr lang="en-US" dirty="0"/>
               <a:t>This applies to everything in python </a:t>
             </a:r>
           </a:p>
           <a:p>
             <a:pPr lvl="1"/>
             <a:r>
-              <a:rPr lang="en-US" dirty="0" smtClean="0"/>
+              <a:rPr lang="en-US" dirty="0"/>
               <a:t>Type attribute: string, integer, float, list, array, etc. </a:t>
             </a:r>
           </a:p>
           <a:p>
             <a:pPr lvl="1"/>
             <a:r>
-              <a:rPr lang="en-US" dirty="0" smtClean="0"/>
+              <a:rPr lang="en-US" dirty="0"/>
               <a:t>Values: numerical types have the number itself attached to them </a:t>
             </a:r>
           </a:p>
           <a:p>
             <a:pPr lvl="1"/>
             <a:r>
-              <a:rPr lang="en-US" dirty="0" smtClean="0"/>
+              <a:rPr lang="en-US" dirty="0"/>
               <a:t>Lists/Arrays: length, the objects they store </a:t>
             </a:r>
           </a:p>
@@ -9049,11 +9006,11 @@
           <a:lstStyle/>
           <a:p>
             <a:r>
-              <a:rPr lang="en-US" dirty="0" smtClean="0"/>
+              <a:rPr lang="en-US" dirty="0"/>
               <a:t>Weak Typing vs. </a:t>
             </a:r>
             <a:r>
-              <a:rPr lang="en-US" smtClean="0"/>
+              <a:rPr lang="en-US"/>
               <a:t>Strong Typing </a:t>
             </a:r>
             <a:endParaRPr lang="en-US" dirty="0"/>
@@ -9083,18 +9040,17 @@
           <a:lstStyle/>
           <a:p>
             <a:r>
-              <a:rPr lang="en-US" b="0" dirty="0" smtClean="0"/>
+              <a:rPr lang="en-US" b="0" dirty="0"/>
               <a:t>Python: A </a:t>
             </a:r>
             <a:r>
-              <a:rPr lang="en-US" dirty="0" smtClean="0"/>
+              <a:rPr lang="en-US" dirty="0"/>
               <a:t>weakly</a:t>
             </a:r>
             <a:r>
-              <a:rPr lang="en-US" b="0" dirty="0" smtClean="0"/>
+              <a:rPr lang="en-US" b="0" dirty="0"/>
               <a:t> typed language </a:t>
             </a:r>
-            <a:endParaRPr lang="en-US" b="0" dirty="0"/>
           </a:p>
         </p:txBody>
       </p:sp>
@@ -9114,7 +9070,7 @@
           <a:lstStyle/>
           <a:p>
             <a:r>
-              <a:rPr lang="en-US" dirty="0" smtClean="0"/>
+              <a:rPr lang="en-US" dirty="0"/>
               <a:t>Example: x = 3 </a:t>
             </a:r>
           </a:p>
@@ -9122,44 +9078,43 @@
             <a:endParaRPr lang="en-US" dirty="0"/>
           </a:p>
           <a:p>
-            <a:endParaRPr lang="en-US" dirty="0" smtClean="0"/>
-          </a:p>
-          <a:p>
-            <a:r>
-              <a:rPr lang="en-US" dirty="0" smtClean="0"/>
+            <a:endParaRPr lang="en-US" dirty="0"/>
+          </a:p>
+          <a:p>
+            <a:r>
+              <a:rPr lang="en-US" dirty="0"/>
               <a:t>Python knows that x is an integer, and you </a:t>
             </a:r>
             <a:r>
-              <a:rPr lang="en-US" b="1" i="1" dirty="0" smtClean="0"/>
+              <a:rPr lang="en-US" b="1" i="1" dirty="0"/>
               <a:t>are </a:t>
             </a:r>
             <a:r>
-              <a:rPr lang="en-US" dirty="0" smtClean="0"/>
+              <a:rPr lang="en-US" dirty="0"/>
               <a:t>able to change that</a:t>
             </a:r>
           </a:p>
           <a:p>
             <a:pPr lvl="1"/>
             <a:r>
-              <a:rPr lang="en-US" dirty="0" smtClean="0"/>
+              <a:rPr lang="en-US" dirty="0"/>
               <a:t>x = 3.1 changes x’s type to float </a:t>
             </a:r>
           </a:p>
           <a:p>
             <a:pPr lvl="1"/>
             <a:r>
-              <a:rPr lang="en-US" dirty="0" smtClean="0"/>
+              <a:rPr lang="en-US" dirty="0"/>
               <a:t>x = “example” changes it to </a:t>
             </a:r>
             <a:r>
-              <a:rPr lang="en-US" dirty="0" err="1" smtClean="0"/>
+              <a:rPr lang="en-US" dirty="0" err="1"/>
               <a:t>str</a:t>
             </a:r>
             <a:r>
-              <a:rPr lang="en-US" dirty="0" smtClean="0"/>
+              <a:rPr lang="en-US" dirty="0"/>
               <a:t> </a:t>
             </a:r>
-            <a:endParaRPr lang="en-US" dirty="0"/>
           </a:p>
         </p:txBody>
       </p:sp>
@@ -9184,18 +9139,17 @@
           <a:lstStyle/>
           <a:p>
             <a:r>
-              <a:rPr lang="en-US" b="0" dirty="0" smtClean="0"/>
+              <a:rPr lang="en-US" b="0" dirty="0"/>
               <a:t>C/C++: A </a:t>
             </a:r>
             <a:r>
-              <a:rPr lang="en-US" dirty="0" smtClean="0"/>
+              <a:rPr lang="en-US" dirty="0"/>
               <a:t>strongly</a:t>
             </a:r>
             <a:r>
-              <a:rPr lang="en-US" b="0" dirty="0" smtClean="0"/>
+              <a:rPr lang="en-US" b="0" dirty="0"/>
               <a:t> typed language </a:t>
             </a:r>
-            <a:endParaRPr lang="en-US" b="0" dirty="0"/>
           </a:p>
         </p:txBody>
       </p:sp>
@@ -9215,15 +9169,15 @@
           <a:lstStyle/>
           <a:p>
             <a:r>
-              <a:rPr lang="en-US" dirty="0" smtClean="0"/>
+              <a:rPr lang="en-US" dirty="0"/>
               <a:t>Example: </a:t>
             </a:r>
             <a:r>
-              <a:rPr lang="en-US" dirty="0" err="1" smtClean="0"/>
+              <a:rPr lang="en-US" dirty="0" err="1"/>
               <a:t>int</a:t>
             </a:r>
             <a:r>
-              <a:rPr lang="en-US" dirty="0" smtClean="0"/>
+              <a:rPr lang="en-US" dirty="0"/>
               <a:t> x = 3; </a:t>
             </a:r>
           </a:p>
@@ -9231,33 +9185,28 @@
             <a:endParaRPr lang="en-US" dirty="0"/>
           </a:p>
           <a:p>
-            <a:endParaRPr lang="en-US" dirty="0" smtClean="0"/>
-          </a:p>
-          <a:p>
-            <a:r>
-              <a:rPr lang="en-US" dirty="0" smtClean="0"/>
+            <a:endParaRPr lang="en-US" dirty="0"/>
+          </a:p>
+          <a:p>
+            <a:r>
+              <a:rPr lang="en-US" dirty="0"/>
               <a:t>You have to tell your program that x is an integer, and you </a:t>
             </a:r>
             <a:r>
-              <a:rPr lang="en-US" b="1" i="1" dirty="0" smtClean="0"/>
+              <a:rPr lang="en-US" b="1" i="1" dirty="0"/>
               <a:t>are not</a:t>
             </a:r>
             <a:r>
               <a:rPr lang="en-US" dirty="0"/>
-              <a:t> </a:t>
-            </a:r>
-            <a:r>
-              <a:rPr lang="en-US" dirty="0" smtClean="0"/>
-              <a:t>able to change that </a:t>
+              <a:t> able to change that </a:t>
             </a:r>
           </a:p>
           <a:p>
             <a:pPr lvl="1"/>
             <a:r>
-              <a:rPr lang="en-US" dirty="0" smtClean="0"/>
+              <a:rPr lang="en-US" dirty="0"/>
               <a:t>x = 3.1; produces an error </a:t>
             </a:r>
-            <a:endParaRPr lang="en-US" dirty="0"/>
           </a:p>
         </p:txBody>
       </p:sp>
@@ -9307,10 +9256,9 @@
           <a:lstStyle/>
           <a:p>
             <a:r>
-              <a:rPr lang="en-US" dirty="0" smtClean="0"/>
+              <a:rPr lang="en-US" dirty="0"/>
               <a:t>Summary </a:t>
             </a:r>
-            <a:endParaRPr lang="en-US" dirty="0"/>
           </a:p>
         </p:txBody>
       </p:sp>
@@ -9338,15 +9286,15 @@
               <a:buNone/>
             </a:pPr>
             <a:r>
-              <a:rPr lang="en-US" dirty="0" smtClean="0"/>
+              <a:rPr lang="en-US" dirty="0"/>
               <a:t>Python is an interpreted language </a:t>
             </a:r>
             <a:r>
-              <a:rPr lang="mr-IN" dirty="0" smtClean="0"/>
+              <a:rPr lang="mr-IN" dirty="0"/>
               <a:t>–</a:t>
             </a:r>
             <a:r>
-              <a:rPr lang="en-US" dirty="0" smtClean="0"/>
+              <a:rPr lang="en-US" dirty="0"/>
               <a:t> this makes it easy to write but slow </a:t>
             </a:r>
           </a:p>
@@ -9361,15 +9309,15 @@
               <a:buNone/>
             </a:pPr>
             <a:r>
-              <a:rPr lang="en-US" dirty="0" smtClean="0"/>
+              <a:rPr lang="en-US" dirty="0"/>
               <a:t>The Python Interpreter </a:t>
             </a:r>
             <a:r>
-              <a:rPr lang="mr-IN" dirty="0" smtClean="0"/>
+              <a:rPr lang="mr-IN" dirty="0"/>
               <a:t>–</a:t>
             </a:r>
             <a:r>
-              <a:rPr lang="en-US" dirty="0" smtClean="0"/>
+              <a:rPr lang="en-US" dirty="0"/>
               <a:t> the program which runs the python code you’ve written </a:t>
             </a:r>
           </a:p>
@@ -9384,23 +9332,23 @@
               <a:buNone/>
             </a:pPr>
             <a:r>
-              <a:rPr lang="en-US" dirty="0" smtClean="0"/>
+              <a:rPr lang="en-US" dirty="0"/>
               <a:t>The Python Model </a:t>
             </a:r>
             <a:r>
-              <a:rPr lang="mr-IN" dirty="0" smtClean="0"/>
+              <a:rPr lang="mr-IN" dirty="0"/>
               <a:t>–</a:t>
             </a:r>
             <a:r>
-              <a:rPr lang="en-US" dirty="0" smtClean="0"/>
+              <a:rPr lang="en-US" dirty="0"/>
               <a:t> </a:t>
             </a:r>
             <a:r>
-              <a:rPr lang="en-US" b="1" i="1" dirty="0" smtClean="0"/>
+              <a:rPr lang="en-US" b="1" i="1" dirty="0"/>
               <a:t>Everything </a:t>
             </a:r>
             <a:r>
-              <a:rPr lang="en-US" dirty="0" smtClean="0"/>
+              <a:rPr lang="en-US" dirty="0"/>
               <a:t>is an object </a:t>
             </a:r>
           </a:p>
@@ -9415,22 +9363,22 @@
               <a:buNone/>
             </a:pPr>
             <a:r>
-              <a:rPr lang="en-US" dirty="0" smtClean="0"/>
+              <a:rPr lang="en-US" dirty="0"/>
               <a:t>Weak Typing </a:t>
             </a:r>
             <a:r>
-              <a:rPr lang="mr-IN" dirty="0" smtClean="0"/>
+              <a:rPr lang="mr-IN" dirty="0"/>
               <a:t>–</a:t>
             </a:r>
             <a:r>
-              <a:rPr lang="en-US" dirty="0" smtClean="0"/>
+              <a:rPr lang="en-US" dirty="0"/>
               <a:t> Python keeps track </a:t>
             </a:r>
             <a:r>
-              <a:rPr lang="en-US" smtClean="0"/>
+              <a:rPr lang="en-US"/>
               <a:t>of data types for you </a:t>
             </a:r>
-            <a:endParaRPr lang="en-US" dirty="0" smtClean="0"/>
+            <a:endParaRPr lang="en-US" dirty="0"/>
           </a:p>
           <a:p>
             <a:pPr marL="0" indent="0">

</xml_diff>

<commit_message>
slides: minor updates to session 1
</commit_message>
<xml_diff>
--- a/slides/context.pptx
+++ b/slides/context.pptx
@@ -5,7 +5,7 @@
     <p:sldMasterId id="2147484294" r:id="rId1"/>
   </p:sldMasterIdLst>
   <p:notesMasterIdLst>
-    <p:notesMasterId r:id="rId9"/>
+    <p:notesMasterId r:id="rId10"/>
   </p:notesMasterIdLst>
   <p:sldIdLst>
     <p:sldId id="256" r:id="rId2"/>
@@ -14,7 +14,8 @@
     <p:sldId id="259" r:id="rId5"/>
     <p:sldId id="261" r:id="rId6"/>
     <p:sldId id="260" r:id="rId7"/>
-    <p:sldId id="263" r:id="rId8"/>
+    <p:sldId id="265" r:id="rId8"/>
+    <p:sldId id="263" r:id="rId9"/>
   </p:sldIdLst>
   <p:sldSz cx="12192000" cy="6858000"/>
   <p:notesSz cx="6858000" cy="9144000"/>
@@ -203,7 +204,7 @@
           <a:p>
             <a:fld id="{5450099C-8BB7-944A-BC72-CA2F6E7F4B31}" type="datetimeFigureOut">
               <a:rPr lang="en-US" smtClean="0"/>
-              <a:t>5/7/21</a:t>
+              <a:t>4/25/22</a:t>
             </a:fld>
             <a:endParaRPr lang="en-US"/>
           </a:p>
@@ -570,6 +571,90 @@
 </p:notes>
 </file>
 
+<file path=ppt/notesSlides/notesSlide2.xml><?xml version="1.0" encoding="utf-8"?>
+<p:notes xmlns:a="http://schemas.openxmlformats.org/drawingml/2006/main" xmlns:r="http://schemas.openxmlformats.org/officeDocument/2006/relationships" xmlns:p="http://schemas.openxmlformats.org/presentationml/2006/main">
+  <p:cSld>
+    <p:spTree>
+      <p:nvGrpSpPr>
+        <p:cNvPr id="1" name=""/>
+        <p:cNvGrpSpPr/>
+        <p:nvPr/>
+      </p:nvGrpSpPr>
+      <p:grpSpPr>
+        <a:xfrm>
+          <a:off x="0" y="0"/>
+          <a:ext cx="0" cy="0"/>
+          <a:chOff x="0" y="0"/>
+          <a:chExt cx="0" cy="0"/>
+        </a:xfrm>
+      </p:grpSpPr>
+      <p:sp>
+        <p:nvSpPr>
+          <p:cNvPr id="2" name="Slide Image Placeholder 1"/>
+          <p:cNvSpPr>
+            <a:spLocks noGrp="1" noRot="1" noChangeAspect="1"/>
+          </p:cNvSpPr>
+          <p:nvPr>
+            <p:ph type="sldImg"/>
+          </p:nvPr>
+        </p:nvSpPr>
+        <p:spPr/>
+      </p:sp>
+      <p:sp>
+        <p:nvSpPr>
+          <p:cNvPr id="3" name="Notes Placeholder 2"/>
+          <p:cNvSpPr>
+            <a:spLocks noGrp="1"/>
+          </p:cNvSpPr>
+          <p:nvPr>
+            <p:ph type="body" idx="1"/>
+          </p:nvPr>
+        </p:nvSpPr>
+        <p:spPr/>
+        <p:txBody>
+          <a:bodyPr/>
+          <a:lstStyle/>
+          <a:p>
+            <a:endParaRPr lang="en-US" dirty="0"/>
+          </a:p>
+        </p:txBody>
+      </p:sp>
+      <p:sp>
+        <p:nvSpPr>
+          <p:cNvPr id="4" name="Slide Number Placeholder 3"/>
+          <p:cNvSpPr>
+            <a:spLocks noGrp="1"/>
+          </p:cNvSpPr>
+          <p:nvPr>
+            <p:ph type="sldNum" sz="quarter" idx="5"/>
+          </p:nvPr>
+        </p:nvSpPr>
+        <p:spPr/>
+        <p:txBody>
+          <a:bodyPr/>
+          <a:lstStyle/>
+          <a:p>
+            <a:fld id="{5FFDBB08-D643-7140-B45F-C5B77B24C685}" type="slidenum">
+              <a:rPr lang="en-US" smtClean="0"/>
+              <a:t>7</a:t>
+            </a:fld>
+            <a:endParaRPr lang="en-US"/>
+          </a:p>
+        </p:txBody>
+      </p:sp>
+    </p:spTree>
+    <p:extLst>
+      <p:ext uri="{BB962C8B-B14F-4D97-AF65-F5344CB8AC3E}">
+        <p14:creationId xmlns:p14="http://schemas.microsoft.com/office/powerpoint/2010/main" val="4144126517"/>
+      </p:ext>
+    </p:extLst>
+  </p:cSld>
+  <p:clrMapOvr>
+    <a:masterClrMapping/>
+  </p:clrMapOvr>
+</p:notes>
+</file>
+
 <file path=ppt/slideLayouts/slideLayout1.xml><?xml version="1.0" encoding="utf-8"?>
 <p:sldLayout xmlns:a="http://schemas.openxmlformats.org/drawingml/2006/main" xmlns:r="http://schemas.openxmlformats.org/officeDocument/2006/relationships" xmlns:p="http://schemas.openxmlformats.org/presentationml/2006/main" type="title" preserve="1">
   <p:cSld name="Title Slide">
@@ -846,7 +931,7 @@
           <a:p>
             <a:fld id="{51673806-0BCD-1F42-BAA8-2011034B3C6A}" type="datetimeFigureOut">
               <a:rPr lang="en-US" smtClean="0"/>
-              <a:t>5/7/21</a:t>
+              <a:t>4/25/22</a:t>
             </a:fld>
             <a:endParaRPr lang="en-US"/>
           </a:p>
@@ -1260,7 +1345,7 @@
           <a:p>
             <a:fld id="{51673806-0BCD-1F42-BAA8-2011034B3C6A}" type="datetimeFigureOut">
               <a:rPr lang="en-US" smtClean="0"/>
-              <a:t>5/7/21</a:t>
+              <a:t>4/25/22</a:t>
             </a:fld>
             <a:endParaRPr lang="en-US"/>
           </a:p>
@@ -1591,7 +1676,7 @@
           <a:p>
             <a:fld id="{51673806-0BCD-1F42-BAA8-2011034B3C6A}" type="datetimeFigureOut">
               <a:rPr lang="en-US" smtClean="0"/>
-              <a:t>5/7/21</a:t>
+              <a:t>4/25/22</a:t>
             </a:fld>
             <a:endParaRPr lang="en-US"/>
           </a:p>
@@ -1991,7 +2076,7 @@
           <a:p>
             <a:fld id="{51673806-0BCD-1F42-BAA8-2011034B3C6A}" type="datetimeFigureOut">
               <a:rPr lang="en-US" smtClean="0"/>
-              <a:t>5/7/21</a:t>
+              <a:t>4/25/22</a:t>
             </a:fld>
             <a:endParaRPr lang="en-US"/>
           </a:p>
@@ -2554,7 +2639,7 @@
           <a:p>
             <a:fld id="{51673806-0BCD-1F42-BAA8-2011034B3C6A}" type="datetimeFigureOut">
               <a:rPr lang="en-US" smtClean="0"/>
-              <a:t>5/7/21</a:t>
+              <a:t>4/25/22</a:t>
             </a:fld>
             <a:endParaRPr lang="en-US"/>
           </a:p>
@@ -3230,7 +3315,7 @@
           <a:p>
             <a:fld id="{51673806-0BCD-1F42-BAA8-2011034B3C6A}" type="datetimeFigureOut">
               <a:rPr lang="en-US" smtClean="0"/>
-              <a:t>5/7/21</a:t>
+              <a:t>4/25/22</a:t>
             </a:fld>
             <a:endParaRPr lang="en-US"/>
           </a:p>
@@ -4138,7 +4223,7 @@
           <a:p>
             <a:fld id="{51673806-0BCD-1F42-BAA8-2011034B3C6A}" type="datetimeFigureOut">
               <a:rPr lang="en-US" smtClean="0"/>
-              <a:t>5/7/21</a:t>
+              <a:t>4/25/22</a:t>
             </a:fld>
             <a:endParaRPr lang="en-US"/>
           </a:p>
@@ -4446,7 +4531,7 @@
           <a:p>
             <a:fld id="{51673806-0BCD-1F42-BAA8-2011034B3C6A}" type="datetimeFigureOut">
               <a:rPr lang="en-US" smtClean="0"/>
-              <a:t>5/7/21</a:t>
+              <a:t>4/25/22</a:t>
             </a:fld>
             <a:endParaRPr lang="en-US"/>
           </a:p>
@@ -4705,7 +4790,7 @@
           <a:p>
             <a:fld id="{51673806-0BCD-1F42-BAA8-2011034B3C6A}" type="datetimeFigureOut">
               <a:rPr lang="en-US" smtClean="0"/>
-              <a:t>5/7/21</a:t>
+              <a:t>4/25/22</a:t>
             </a:fld>
             <a:endParaRPr lang="en-US"/>
           </a:p>
@@ -5028,7 +5113,7 @@
           <a:p>
             <a:fld id="{51673806-0BCD-1F42-BAA8-2011034B3C6A}" type="datetimeFigureOut">
               <a:rPr lang="en-US" smtClean="0"/>
-              <a:t>5/7/21</a:t>
+              <a:t>4/25/22</a:t>
             </a:fld>
             <a:endParaRPr lang="en-US"/>
           </a:p>
@@ -5412,7 +5497,7 @@
           <a:p>
             <a:fld id="{51673806-0BCD-1F42-BAA8-2011034B3C6A}" type="datetimeFigureOut">
               <a:rPr lang="en-US" smtClean="0"/>
-              <a:t>5/7/21</a:t>
+              <a:t>4/25/22</a:t>
             </a:fld>
             <a:endParaRPr lang="en-US"/>
           </a:p>
@@ -5788,7 +5873,7 @@
           <a:p>
             <a:fld id="{51673806-0BCD-1F42-BAA8-2011034B3C6A}" type="datetimeFigureOut">
               <a:rPr lang="en-US" smtClean="0"/>
-              <a:t>5/7/21</a:t>
+              <a:t>4/25/22</a:t>
             </a:fld>
             <a:endParaRPr lang="en-US"/>
           </a:p>
@@ -6294,7 +6379,7 @@
           <a:p>
             <a:fld id="{51673806-0BCD-1F42-BAA8-2011034B3C6A}" type="datetimeFigureOut">
               <a:rPr lang="en-US" smtClean="0"/>
-              <a:t>5/7/21</a:t>
+              <a:t>4/25/22</a:t>
             </a:fld>
             <a:endParaRPr lang="en-US"/>
           </a:p>
@@ -6551,7 +6636,7 @@
           <a:p>
             <a:fld id="{51673806-0BCD-1F42-BAA8-2011034B3C6A}" type="datetimeFigureOut">
               <a:rPr lang="en-US" smtClean="0"/>
-              <a:t>5/7/21</a:t>
+              <a:t>4/25/22</a:t>
             </a:fld>
             <a:endParaRPr lang="en-US"/>
           </a:p>
@@ -6709,7 +6794,7 @@
           <a:p>
             <a:fld id="{51673806-0BCD-1F42-BAA8-2011034B3C6A}" type="datetimeFigureOut">
               <a:rPr lang="en-US" smtClean="0"/>
-              <a:t>5/7/21</a:t>
+              <a:t>4/25/22</a:t>
             </a:fld>
             <a:endParaRPr lang="en-US"/>
           </a:p>
@@ -7099,7 +7184,7 @@
           <a:p>
             <a:fld id="{51673806-0BCD-1F42-BAA8-2011034B3C6A}" type="datetimeFigureOut">
               <a:rPr lang="en-US" smtClean="0"/>
-              <a:t>5/7/21</a:t>
+              <a:t>4/25/22</a:t>
             </a:fld>
             <a:endParaRPr lang="en-US"/>
           </a:p>
@@ -7508,7 +7593,7 @@
           <a:p>
             <a:fld id="{51673806-0BCD-1F42-BAA8-2011034B3C6A}" type="datetimeFigureOut">
               <a:rPr lang="en-US" smtClean="0"/>
-              <a:t>5/7/21</a:t>
+              <a:t>4/25/22</a:t>
             </a:fld>
             <a:endParaRPr lang="en-US"/>
           </a:p>
@@ -7754,7 +7839,7 @@
             <a:fld id="{51673806-0BCD-1F42-BAA8-2011034B3C6A}" type="datetimeFigureOut">
               <a:rPr lang="en-US" smtClean="0"/>
               <a:pPr/>
-              <a:t>5/7/21</a:t>
+              <a:t>4/25/22</a:t>
             </a:fld>
             <a:endParaRPr lang="en-US" dirty="0"/>
           </a:p>
@@ -8310,7 +8395,7 @@
         <p:spPr>
           <a:xfrm>
             <a:off x="680321" y="2336873"/>
-            <a:ext cx="9613861" cy="3627199"/>
+            <a:ext cx="9613861" cy="4113803"/>
           </a:xfrm>
         </p:spPr>
         <p:txBody>
@@ -8322,7 +8407,7 @@
             </a:pPr>
             <a:r>
               <a:rPr lang="en-US" dirty="0"/>
-              <a:t>Python in Comparison to Other Languages </a:t>
+              <a:t>Python in Comparison to Other Languages</a:t>
             </a:r>
           </a:p>
           <a:p>
@@ -8337,7 +8422,7 @@
             </a:pPr>
             <a:r>
               <a:rPr lang="en-US" dirty="0"/>
-              <a:t>The Python Interpreter </a:t>
+              <a:t>The Python Interpreter</a:t>
             </a:r>
           </a:p>
           <a:p>
@@ -8352,7 +8437,22 @@
             </a:pPr>
             <a:r>
               <a:rPr lang="en-US" dirty="0"/>
-              <a:t>The Python Model </a:t>
+              <a:t>The Python Model</a:t>
+            </a:r>
+          </a:p>
+          <a:p>
+            <a:pPr marL="0" indent="0">
+              <a:buNone/>
+            </a:pPr>
+            <a:endParaRPr lang="en-US" dirty="0"/>
+          </a:p>
+          <a:p>
+            <a:pPr marL="0" indent="0">
+              <a:buNone/>
+            </a:pPr>
+            <a:r>
+              <a:rPr lang="en-US" dirty="0"/>
+              <a:t>Static vs. Dynamic Typing</a:t>
             </a:r>
           </a:p>
           <a:p>
@@ -9007,13 +9107,8 @@
           <a:p>
             <a:r>
               <a:rPr lang="en-US" dirty="0"/>
-              <a:t>Weak Typing vs. </a:t>
-            </a:r>
-            <a:r>
-              <a:rPr lang="en-US"/>
-              <a:t>Strong Typing </a:t>
-            </a:r>
-            <a:endParaRPr lang="en-US" dirty="0"/>
+              <a:t>Static Typing vs. Dynamic Typing </a:t>
+            </a:r>
           </a:p>
         </p:txBody>
       </p:sp>
@@ -9030,7 +9125,7 @@
         <p:spPr>
           <a:xfrm>
             <a:off x="680319" y="2336873"/>
-            <a:ext cx="4698358" cy="693135"/>
+            <a:ext cx="5387972" cy="693135"/>
           </a:xfrm>
         </p:spPr>
         <p:txBody>
@@ -9041,15 +9136,15 @@
           <a:p>
             <a:r>
               <a:rPr lang="en-US" b="0" dirty="0"/>
-              <a:t>Python: A </a:t>
+              <a:t>Python: </a:t>
             </a:r>
             <a:r>
               <a:rPr lang="en-US" dirty="0"/>
-              <a:t>weakly</a:t>
+              <a:t>Dynamic</a:t>
             </a:r>
             <a:r>
               <a:rPr lang="en-US" b="0" dirty="0"/>
-              <a:t> typed language </a:t>
+              <a:t> Typing</a:t>
             </a:r>
           </a:p>
         </p:txBody>
@@ -9064,7 +9159,12 @@
             <p:ph sz="half" idx="2"/>
           </p:nvPr>
         </p:nvSpPr>
-        <p:spPr/>
+        <p:spPr>
+          <a:xfrm>
+            <a:off x="680322" y="3030008"/>
+            <a:ext cx="5387969" cy="2906179"/>
+          </a:xfrm>
+        </p:spPr>
         <p:txBody>
           <a:bodyPr/>
           <a:lstStyle/>
@@ -9130,8 +9230,45 @@
         </p:nvSpPr>
         <p:spPr>
           <a:xfrm>
-            <a:off x="5594123" y="2336873"/>
+            <a:off x="6566712" y="2336873"/>
             <a:ext cx="4700059" cy="692076"/>
+          </a:xfrm>
+        </p:spPr>
+        <p:txBody>
+          <a:bodyPr>
+            <a:normAutofit/>
+          </a:bodyPr>
+          <a:lstStyle/>
+          <a:p>
+            <a:r>
+              <a:rPr lang="en-US" b="0" dirty="0"/>
+              <a:t>C/C++: </a:t>
+            </a:r>
+            <a:r>
+              <a:rPr lang="en-US" dirty="0"/>
+              <a:t>Static</a:t>
+            </a:r>
+            <a:r>
+              <a:rPr lang="en-US" b="0" dirty="0"/>
+              <a:t> Typing</a:t>
+            </a:r>
+          </a:p>
+        </p:txBody>
+      </p:sp>
+      <p:sp>
+        <p:nvSpPr>
+          <p:cNvPr id="6" name="Content Placeholder 5"/>
+          <p:cNvSpPr>
+            <a:spLocks noGrp="1"/>
+          </p:cNvSpPr>
+          <p:nvPr>
+            <p:ph sz="quarter" idx="4"/>
+          </p:nvPr>
+        </p:nvSpPr>
+        <p:spPr>
+          <a:xfrm>
+            <a:off x="6566712" y="3030008"/>
+            <a:ext cx="4700059" cy="2906179"/>
           </a:xfrm>
         </p:spPr>
         <p:txBody>
@@ -9139,36 +9276,6 @@
           <a:lstStyle/>
           <a:p>
             <a:r>
-              <a:rPr lang="en-US" b="0" dirty="0"/>
-              <a:t>C/C++: A </a:t>
-            </a:r>
-            <a:r>
-              <a:rPr lang="en-US" dirty="0"/>
-              <a:t>strongly</a:t>
-            </a:r>
-            <a:r>
-              <a:rPr lang="en-US" b="0" dirty="0"/>
-              <a:t> typed language </a:t>
-            </a:r>
-          </a:p>
-        </p:txBody>
-      </p:sp>
-      <p:sp>
-        <p:nvSpPr>
-          <p:cNvPr id="6" name="Content Placeholder 5"/>
-          <p:cNvSpPr>
-            <a:spLocks noGrp="1"/>
-          </p:cNvSpPr>
-          <p:nvPr>
-            <p:ph sz="quarter" idx="4"/>
-          </p:nvPr>
-        </p:nvSpPr>
-        <p:spPr/>
-        <p:txBody>
-          <a:bodyPr/>
-          <a:lstStyle/>
-          <a:p>
-            <a:r>
               <a:rPr lang="en-US" dirty="0"/>
               <a:t>Example: </a:t>
             </a:r>
@@ -9178,7 +9285,7 @@
             </a:r>
             <a:r>
               <a:rPr lang="en-US" dirty="0"/>
-              <a:t> x = 3; </a:t>
+              <a:t> x = 3;</a:t>
             </a:r>
           </a:p>
           <a:p>
@@ -9198,7 +9305,7 @@
             </a:r>
             <a:r>
               <a:rPr lang="en-US" dirty="0"/>
-              <a:t> able to change that </a:t>
+              <a:t> able to change that</a:t>
             </a:r>
           </a:p>
           <a:p>
@@ -9257,31 +9364,501 @@
           <a:p>
             <a:r>
               <a:rPr lang="en-US" dirty="0"/>
-              <a:t>Summary </a:t>
-            </a:r>
-          </a:p>
-        </p:txBody>
-      </p:sp>
-      <p:sp>
-        <p:nvSpPr>
-          <p:cNvPr id="3" name="Content Placeholder 2"/>
-          <p:cNvSpPr>
-            <a:spLocks noGrp="1"/>
-          </p:cNvSpPr>
-          <p:nvPr>
-            <p:ph idx="1"/>
-          </p:nvPr>
-        </p:nvSpPr>
-        <p:spPr>
-          <a:xfrm>
-            <a:off x="680321" y="2336873"/>
-            <a:ext cx="11206879" cy="3599316"/>
-          </a:xfrm>
-        </p:spPr>
+              <a:t>Strong Typing vs. Weak Typing</a:t>
+            </a:r>
+          </a:p>
+        </p:txBody>
+      </p:sp>
+      <p:sp>
+        <p:nvSpPr>
+          <p:cNvPr id="3" name="Text Placeholder 2"/>
+          <p:cNvSpPr>
+            <a:spLocks noGrp="1"/>
+          </p:cNvSpPr>
+          <p:nvPr>
+            <p:ph type="body" idx="1"/>
+          </p:nvPr>
+        </p:nvSpPr>
+        <p:spPr>
+          <a:xfrm>
+            <a:off x="678873" y="3094372"/>
+            <a:ext cx="5387972" cy="502939"/>
+          </a:xfrm>
+        </p:spPr>
+        <p:txBody>
+          <a:bodyPr>
+            <a:normAutofit/>
+          </a:bodyPr>
+          <a:lstStyle/>
+          <a:p>
+            <a:r>
+              <a:rPr lang="en-US" b="0" dirty="0"/>
+              <a:t>Python: </a:t>
+            </a:r>
+            <a:r>
+              <a:rPr lang="en-US" dirty="0"/>
+              <a:t>Stronger</a:t>
+            </a:r>
+            <a:r>
+              <a:rPr lang="en-US" b="0" dirty="0"/>
+              <a:t> Typing</a:t>
+            </a:r>
+          </a:p>
+        </p:txBody>
+      </p:sp>
+      <p:sp>
+        <p:nvSpPr>
+          <p:cNvPr id="4" name="Content Placeholder 3"/>
+          <p:cNvSpPr>
+            <a:spLocks noGrp="1"/>
+          </p:cNvSpPr>
+          <p:nvPr>
+            <p:ph sz="half" idx="2"/>
+          </p:nvPr>
+        </p:nvSpPr>
+        <p:spPr>
+          <a:xfrm>
+            <a:off x="678876" y="3597311"/>
+            <a:ext cx="5387969" cy="3260689"/>
+          </a:xfrm>
+        </p:spPr>
+        <p:txBody>
+          <a:bodyPr>
+            <a:normAutofit/>
+          </a:bodyPr>
+          <a:lstStyle/>
+          <a:p>
+            <a:r>
+              <a:rPr lang="en-US" dirty="0"/>
+              <a:t>Example: x = 3</a:t>
+            </a:r>
+            <a:br>
+              <a:rPr lang="en-US" dirty="0"/>
+            </a:br>
+            <a:r>
+              <a:rPr lang="en-US" dirty="0"/>
+              <a:t>	       y = “4”</a:t>
+            </a:r>
+          </a:p>
+          <a:p>
+            <a:endParaRPr lang="en-US" dirty="0"/>
+          </a:p>
+          <a:p>
+            <a:r>
+              <a:rPr lang="en-US" dirty="0"/>
+              <a:t>Python stores x as type </a:t>
+            </a:r>
+            <a:r>
+              <a:rPr lang="en-US" i="1" dirty="0" err="1"/>
+              <a:t>int</a:t>
+            </a:r>
+            <a:r>
+              <a:rPr lang="en-US" dirty="0"/>
+              <a:t>, and that allows certain interactions w/different data types</a:t>
+            </a:r>
+          </a:p>
+          <a:p>
+            <a:pPr lvl="1"/>
+            <a:r>
+              <a:rPr lang="en-US" dirty="0"/>
+              <a:t>x + y produces an error</a:t>
+            </a:r>
+          </a:p>
+          <a:p>
+            <a:pPr lvl="1"/>
+            <a:r>
+              <a:rPr lang="en-US" dirty="0"/>
+              <a:t>x * y produces “444”</a:t>
+            </a:r>
+          </a:p>
+        </p:txBody>
+      </p:sp>
+      <p:sp>
+        <p:nvSpPr>
+          <p:cNvPr id="5" name="Text Placeholder 4"/>
+          <p:cNvSpPr>
+            <a:spLocks noGrp="1"/>
+          </p:cNvSpPr>
+          <p:nvPr>
+            <p:ph type="body" sz="quarter" idx="3"/>
+          </p:nvPr>
+        </p:nvSpPr>
+        <p:spPr>
+          <a:xfrm>
+            <a:off x="6565266" y="3128682"/>
+            <a:ext cx="4913164" cy="468629"/>
+          </a:xfrm>
+        </p:spPr>
+        <p:txBody>
+          <a:bodyPr>
+            <a:normAutofit/>
+          </a:bodyPr>
+          <a:lstStyle/>
+          <a:p>
+            <a:r>
+              <a:rPr lang="en-US" b="0" dirty="0"/>
+              <a:t>JavaScript: </a:t>
+            </a:r>
+            <a:r>
+              <a:rPr lang="en-US" dirty="0"/>
+              <a:t>Weaker</a:t>
+            </a:r>
+            <a:r>
+              <a:rPr lang="en-US" b="0" dirty="0"/>
+              <a:t> Typing</a:t>
+            </a:r>
+          </a:p>
+        </p:txBody>
+      </p:sp>
+      <p:sp>
+        <p:nvSpPr>
+          <p:cNvPr id="6" name="Content Placeholder 5"/>
+          <p:cNvSpPr>
+            <a:spLocks noGrp="1"/>
+          </p:cNvSpPr>
+          <p:nvPr>
+            <p:ph sz="quarter" idx="4"/>
+          </p:nvPr>
+        </p:nvSpPr>
+        <p:spPr>
+          <a:xfrm>
+            <a:off x="6565266" y="3597311"/>
+            <a:ext cx="4700059" cy="3260689"/>
+          </a:xfrm>
+        </p:spPr>
+        <p:txBody>
+          <a:bodyPr>
+            <a:normAutofit/>
+          </a:bodyPr>
+          <a:lstStyle/>
+          <a:p>
+            <a:r>
+              <a:rPr lang="en-US" dirty="0"/>
+              <a:t>Example: </a:t>
+            </a:r>
+            <a:r>
+              <a:rPr lang="en-US" dirty="0" err="1"/>
+              <a:t>var</a:t>
+            </a:r>
+            <a:r>
+              <a:rPr lang="en-US" dirty="0"/>
+              <a:t> x = 3;</a:t>
+            </a:r>
+            <a:br>
+              <a:rPr lang="en-US" dirty="0"/>
+            </a:br>
+            <a:r>
+              <a:rPr lang="en-US" dirty="0"/>
+              <a:t>	       </a:t>
+            </a:r>
+            <a:r>
+              <a:rPr lang="en-US" dirty="0" err="1"/>
+              <a:t>var</a:t>
+            </a:r>
+            <a:r>
+              <a:rPr lang="en-US" dirty="0"/>
+              <a:t> y = “4”;</a:t>
+            </a:r>
+          </a:p>
+          <a:p>
+            <a:endParaRPr lang="en-US" dirty="0"/>
+          </a:p>
+          <a:p>
+            <a:r>
+              <a:rPr lang="en-US" dirty="0"/>
+              <a:t>JS makes more “best guesses” on how to interpret data than Python</a:t>
+            </a:r>
+          </a:p>
+          <a:p>
+            <a:pPr lvl="1"/>
+            <a:r>
+              <a:rPr lang="en-US" dirty="0"/>
+              <a:t>x + y produces “34” in JS</a:t>
+            </a:r>
+          </a:p>
+          <a:p>
+            <a:pPr lvl="1"/>
+            <a:r>
+              <a:rPr lang="en-US" dirty="0"/>
+              <a:t>x * y produces 12 in JS</a:t>
+            </a:r>
+          </a:p>
+        </p:txBody>
+      </p:sp>
+      <p:sp>
+        <p:nvSpPr>
+          <p:cNvPr id="7" name="Text Placeholder 2">
+            <a:extLst>
+              <a:ext uri="{FF2B5EF4-FFF2-40B4-BE49-F238E27FC236}">
+                <a16:creationId xmlns:a16="http://schemas.microsoft.com/office/drawing/2014/main" id="{82AF28FE-8381-1544-B5AD-6F47F755EAD5}"/>
+              </a:ext>
+            </a:extLst>
+          </p:cNvPr>
+          <p:cNvSpPr txBox="1">
+            <a:spLocks/>
+          </p:cNvSpPr>
+          <p:nvPr/>
+        </p:nvSpPr>
+        <p:spPr>
+          <a:xfrm>
+            <a:off x="973914" y="2057474"/>
+            <a:ext cx="10185862" cy="847899"/>
+          </a:xfrm>
+          <a:prstGeom prst="rect">
+            <a:avLst/>
+          </a:prstGeom>
+        </p:spPr>
+        <p:txBody>
+          <a:bodyPr vert="horz" lIns="91440" tIns="45720" rIns="91440" bIns="45720" rtlCol="0" anchor="b">
+            <a:noAutofit/>
+          </a:bodyPr>
+          <a:lstStyle>
+            <a:lvl1pPr marL="0" indent="0" algn="l" defTabSz="914400" rtl="0" eaLnBrk="1" latinLnBrk="0" hangingPunct="1">
+              <a:lnSpc>
+                <a:spcPct val="90000"/>
+              </a:lnSpc>
+              <a:spcBef>
+                <a:spcPts val="1000"/>
+              </a:spcBef>
+              <a:buFont typeface="Arial" panose="020B0604020202020204" pitchFamily="34" charset="0"/>
+              <a:buNone/>
+              <a:defRPr sz="2400" b="1" kern="1200">
+                <a:solidFill>
+                  <a:schemeClr val="tx1"/>
+                </a:solidFill>
+                <a:latin typeface="Times New Roman" charset="0"/>
+                <a:ea typeface="Times New Roman" charset="0"/>
+                <a:cs typeface="Times New Roman" charset="0"/>
+              </a:defRPr>
+            </a:lvl1pPr>
+            <a:lvl2pPr marL="457200" indent="0" algn="l" defTabSz="914400" rtl="0" eaLnBrk="1" latinLnBrk="0" hangingPunct="1">
+              <a:lnSpc>
+                <a:spcPct val="90000"/>
+              </a:lnSpc>
+              <a:spcBef>
+                <a:spcPts val="500"/>
+              </a:spcBef>
+              <a:buFont typeface="Arial" panose="020B0604020202020204" pitchFamily="34" charset="0"/>
+              <a:buNone/>
+              <a:defRPr sz="2000" b="1" kern="1200">
+                <a:solidFill>
+                  <a:schemeClr val="tx1"/>
+                </a:solidFill>
+                <a:latin typeface="Times New Roman" charset="0"/>
+                <a:ea typeface="Times New Roman" charset="0"/>
+                <a:cs typeface="Times New Roman" charset="0"/>
+              </a:defRPr>
+            </a:lvl2pPr>
+            <a:lvl3pPr marL="914400" indent="0" algn="l" defTabSz="914400" rtl="0" eaLnBrk="1" latinLnBrk="0" hangingPunct="1">
+              <a:lnSpc>
+                <a:spcPct val="90000"/>
+              </a:lnSpc>
+              <a:spcBef>
+                <a:spcPts val="500"/>
+              </a:spcBef>
+              <a:buFont typeface="Arial" panose="020B0604020202020204" pitchFamily="34" charset="0"/>
+              <a:buNone/>
+              <a:defRPr sz="1800" b="1" kern="1200">
+                <a:solidFill>
+                  <a:schemeClr val="tx1"/>
+                </a:solidFill>
+                <a:latin typeface="Times New Roman" charset="0"/>
+                <a:ea typeface="Times New Roman" charset="0"/>
+                <a:cs typeface="Times New Roman" charset="0"/>
+              </a:defRPr>
+            </a:lvl3pPr>
+            <a:lvl4pPr marL="1371600" indent="0" algn="l" defTabSz="914400" rtl="0" eaLnBrk="1" latinLnBrk="0" hangingPunct="1">
+              <a:lnSpc>
+                <a:spcPct val="90000"/>
+              </a:lnSpc>
+              <a:spcBef>
+                <a:spcPts val="500"/>
+              </a:spcBef>
+              <a:buFont typeface="Arial" panose="020B0604020202020204" pitchFamily="34" charset="0"/>
+              <a:buNone/>
+              <a:defRPr sz="1600" b="1" kern="1200">
+                <a:solidFill>
+                  <a:schemeClr val="tx1"/>
+                </a:solidFill>
+                <a:latin typeface="Times New Roman" charset="0"/>
+                <a:ea typeface="Times New Roman" charset="0"/>
+                <a:cs typeface="Times New Roman" charset="0"/>
+              </a:defRPr>
+            </a:lvl4pPr>
+            <a:lvl5pPr marL="1828800" indent="0" algn="l" defTabSz="914400" rtl="0" eaLnBrk="1" latinLnBrk="0" hangingPunct="1">
+              <a:lnSpc>
+                <a:spcPct val="90000"/>
+              </a:lnSpc>
+              <a:spcBef>
+                <a:spcPts val="500"/>
+              </a:spcBef>
+              <a:buFont typeface="Arial" panose="020B0604020202020204" pitchFamily="34" charset="0"/>
+              <a:buNone/>
+              <a:defRPr sz="1600" b="1" kern="1200">
+                <a:solidFill>
+                  <a:schemeClr val="tx1"/>
+                </a:solidFill>
+                <a:latin typeface="Times New Roman" charset="0"/>
+                <a:ea typeface="Times New Roman" charset="0"/>
+                <a:cs typeface="Times New Roman" charset="0"/>
+              </a:defRPr>
+            </a:lvl5pPr>
+            <a:lvl6pPr marL="2286000" indent="0" algn="l" defTabSz="914400" rtl="0" eaLnBrk="1" latinLnBrk="0" hangingPunct="1">
+              <a:lnSpc>
+                <a:spcPct val="90000"/>
+              </a:lnSpc>
+              <a:spcBef>
+                <a:spcPts val="500"/>
+              </a:spcBef>
+              <a:buFont typeface="Arial" panose="020B0604020202020204" pitchFamily="34" charset="0"/>
+              <a:buNone/>
+              <a:defRPr sz="1600" b="1" kern="1200">
+                <a:solidFill>
+                  <a:schemeClr val="tx1"/>
+                </a:solidFill>
+                <a:latin typeface="+mn-lt"/>
+                <a:ea typeface="+mn-ea"/>
+                <a:cs typeface="+mn-cs"/>
+              </a:defRPr>
+            </a:lvl6pPr>
+            <a:lvl7pPr marL="2743200" indent="0" algn="l" defTabSz="914400" rtl="0" eaLnBrk="1" latinLnBrk="0" hangingPunct="1">
+              <a:lnSpc>
+                <a:spcPct val="90000"/>
+              </a:lnSpc>
+              <a:spcBef>
+                <a:spcPts val="500"/>
+              </a:spcBef>
+              <a:buFont typeface="Arial" panose="020B0604020202020204" pitchFamily="34" charset="0"/>
+              <a:buNone/>
+              <a:defRPr sz="1600" b="1" kern="1200">
+                <a:solidFill>
+                  <a:schemeClr val="tx1"/>
+                </a:solidFill>
+                <a:latin typeface="+mn-lt"/>
+                <a:ea typeface="+mn-ea"/>
+                <a:cs typeface="+mn-cs"/>
+              </a:defRPr>
+            </a:lvl7pPr>
+            <a:lvl8pPr marL="3200400" indent="0" algn="l" defTabSz="914400" rtl="0" eaLnBrk="1" latinLnBrk="0" hangingPunct="1">
+              <a:lnSpc>
+                <a:spcPct val="90000"/>
+              </a:lnSpc>
+              <a:spcBef>
+                <a:spcPts val="500"/>
+              </a:spcBef>
+              <a:buFont typeface="Arial" panose="020B0604020202020204" pitchFamily="34" charset="0"/>
+              <a:buNone/>
+              <a:defRPr sz="1600" b="1" kern="1200">
+                <a:solidFill>
+                  <a:schemeClr val="tx1"/>
+                </a:solidFill>
+                <a:latin typeface="+mn-lt"/>
+                <a:ea typeface="+mn-ea"/>
+                <a:cs typeface="+mn-cs"/>
+              </a:defRPr>
+            </a:lvl8pPr>
+            <a:lvl9pPr marL="3657600" indent="0" algn="l" defTabSz="914400" rtl="0" eaLnBrk="1" latinLnBrk="0" hangingPunct="1">
+              <a:lnSpc>
+                <a:spcPct val="90000"/>
+              </a:lnSpc>
+              <a:spcBef>
+                <a:spcPts val="500"/>
+              </a:spcBef>
+              <a:buFont typeface="Arial" panose="020B0604020202020204" pitchFamily="34" charset="0"/>
+              <a:buNone/>
+              <a:defRPr sz="1600" b="1" kern="1200">
+                <a:solidFill>
+                  <a:schemeClr val="tx1"/>
+                </a:solidFill>
+                <a:latin typeface="+mn-lt"/>
+                <a:ea typeface="+mn-ea"/>
+                <a:cs typeface="+mn-cs"/>
+              </a:defRPr>
+            </a:lvl9pPr>
+          </a:lstStyle>
+          <a:p>
+            <a:pPr algn="ctr"/>
+            <a:r>
+              <a:rPr lang="en-US" b="0" dirty="0"/>
+              <a:t>Strong/Weak Typing is a spectrum while Static/Dynamic is binary, and its definition is much less standard.</a:t>
+            </a:r>
+          </a:p>
+        </p:txBody>
+      </p:sp>
+    </p:spTree>
+    <p:extLst>
+      <p:ext uri="{BB962C8B-B14F-4D97-AF65-F5344CB8AC3E}">
+        <p14:creationId xmlns:p14="http://schemas.microsoft.com/office/powerpoint/2010/main" val="1941593351"/>
+      </p:ext>
+    </p:extLst>
+  </p:cSld>
+  <p:clrMapOvr>
+    <a:masterClrMapping/>
+  </p:clrMapOvr>
+</p:sld>
+</file>
+
+<file path=ppt/slides/slide8.xml><?xml version="1.0" encoding="utf-8"?>
+<p:sld xmlns:a="http://schemas.openxmlformats.org/drawingml/2006/main" xmlns:r="http://schemas.openxmlformats.org/officeDocument/2006/relationships" xmlns:p="http://schemas.openxmlformats.org/presentationml/2006/main">
+  <p:cSld>
+    <p:spTree>
+      <p:nvGrpSpPr>
+        <p:cNvPr id="1" name=""/>
+        <p:cNvGrpSpPr/>
+        <p:nvPr/>
+      </p:nvGrpSpPr>
+      <p:grpSpPr>
+        <a:xfrm>
+          <a:off x="0" y="0"/>
+          <a:ext cx="0" cy="0"/>
+          <a:chOff x="0" y="0"/>
+          <a:chExt cx="0" cy="0"/>
+        </a:xfrm>
+      </p:grpSpPr>
+      <p:sp>
+        <p:nvSpPr>
+          <p:cNvPr id="2" name="Title 1"/>
+          <p:cNvSpPr>
+            <a:spLocks noGrp="1"/>
+          </p:cNvSpPr>
+          <p:nvPr>
+            <p:ph type="title"/>
+          </p:nvPr>
+        </p:nvSpPr>
+        <p:spPr/>
         <p:txBody>
           <a:bodyPr/>
           <a:lstStyle/>
           <a:p>
+            <a:r>
+              <a:rPr lang="en-US" dirty="0"/>
+              <a:t>Summary </a:t>
+            </a:r>
+          </a:p>
+        </p:txBody>
+      </p:sp>
+      <p:sp>
+        <p:nvSpPr>
+          <p:cNvPr id="3" name="Content Placeholder 2"/>
+          <p:cNvSpPr>
+            <a:spLocks noGrp="1"/>
+          </p:cNvSpPr>
+          <p:nvPr>
+            <p:ph idx="1"/>
+          </p:nvPr>
+        </p:nvSpPr>
+        <p:spPr>
+          <a:xfrm>
+            <a:off x="680321" y="2336872"/>
+            <a:ext cx="11206879" cy="4271746"/>
+          </a:xfrm>
+        </p:spPr>
+        <p:txBody>
+          <a:bodyPr>
+            <a:normAutofit/>
+          </a:bodyPr>
+          <a:lstStyle/>
+          <a:p>
             <a:pPr marL="0" indent="0">
               <a:buNone/>
             </a:pPr>
@@ -9364,7 +9941,7 @@
             </a:pPr>
             <a:r>
               <a:rPr lang="en-US" dirty="0"/>
-              <a:t>Weak Typing </a:t>
+              <a:t>Dynamic Typing </a:t>
             </a:r>
             <a:r>
               <a:rPr lang="mr-IN" dirty="0"/>
@@ -9372,19 +9949,23 @@
             </a:r>
             <a:r>
               <a:rPr lang="en-US" dirty="0"/>
-              <a:t> Python keeps track </a:t>
-            </a:r>
-            <a:r>
-              <a:rPr lang="en-US"/>
-              <a:t>of data types for you </a:t>
-            </a:r>
-            <a:endParaRPr lang="en-US" dirty="0"/>
+              <a:t> Python keeps track of data types for you</a:t>
+            </a:r>
           </a:p>
           <a:p>
             <a:pPr marL="0" indent="0">
               <a:buNone/>
             </a:pPr>
             <a:endParaRPr lang="en-US" dirty="0"/>
+          </a:p>
+          <a:p>
+            <a:pPr marL="0" indent="0">
+              <a:buNone/>
+            </a:pPr>
+            <a:r>
+              <a:rPr lang="en-US" dirty="0"/>
+              <a:t>Typing Strength – Python prohibits some operations between data types</a:t>
+            </a:r>
           </a:p>
           <a:p>
             <a:pPr marL="0" indent="0">

</xml_diff>

<commit_message>
slides: minor notes added
</commit_message>
<xml_diff>
--- a/slides/context.pptx
+++ b/slides/context.pptx
@@ -204,7 +204,7 @@
           <a:p>
             <a:fld id="{5450099C-8BB7-944A-BC72-CA2F6E7F4B31}" type="datetimeFigureOut">
               <a:rPr lang="en-US" smtClean="0"/>
-              <a:t>5/8/22</a:t>
+              <a:t>5/9/22</a:t>
             </a:fld>
             <a:endParaRPr lang="en-US"/>
           </a:p>
@@ -615,7 +615,97 @@
           <a:bodyPr/>
           <a:lstStyle/>
           <a:p>
-            <a:endParaRPr lang="en-US" dirty="0"/>
+            <a:r>
+              <a:rPr lang="en-US" dirty="0"/>
+              <a:t>Advice: it’s best to be explicit (the Python developers themselves also echo this sentiment a lot), so if you need a specific data type for whatever reason, it’s best to include it in the declaration (e.g. x = float(3))</a:t>
+            </a:r>
+          </a:p>
+        </p:txBody>
+      </p:sp>
+      <p:sp>
+        <p:nvSpPr>
+          <p:cNvPr id="4" name="Slide Number Placeholder 3"/>
+          <p:cNvSpPr>
+            <a:spLocks noGrp="1"/>
+          </p:cNvSpPr>
+          <p:nvPr>
+            <p:ph type="sldNum" sz="quarter" idx="5"/>
+          </p:nvPr>
+        </p:nvSpPr>
+        <p:spPr/>
+        <p:txBody>
+          <a:bodyPr/>
+          <a:lstStyle/>
+          <a:p>
+            <a:fld id="{5FFDBB08-D643-7140-B45F-C5B77B24C685}" type="slidenum">
+              <a:rPr lang="en-US" smtClean="0"/>
+              <a:t>6</a:t>
+            </a:fld>
+            <a:endParaRPr lang="en-US"/>
+          </a:p>
+        </p:txBody>
+      </p:sp>
+    </p:spTree>
+    <p:extLst>
+      <p:ext uri="{BB962C8B-B14F-4D97-AF65-F5344CB8AC3E}">
+        <p14:creationId xmlns:p14="http://schemas.microsoft.com/office/powerpoint/2010/main" val="863237719"/>
+      </p:ext>
+    </p:extLst>
+  </p:cSld>
+  <p:clrMapOvr>
+    <a:masterClrMapping/>
+  </p:clrMapOvr>
+</p:notes>
+</file>
+
+<file path=ppt/notesSlides/notesSlide3.xml><?xml version="1.0" encoding="utf-8"?>
+<p:notes xmlns:a="http://schemas.openxmlformats.org/drawingml/2006/main" xmlns:r="http://schemas.openxmlformats.org/officeDocument/2006/relationships" xmlns:p="http://schemas.openxmlformats.org/presentationml/2006/main">
+  <p:cSld>
+    <p:spTree>
+      <p:nvGrpSpPr>
+        <p:cNvPr id="1" name=""/>
+        <p:cNvGrpSpPr/>
+        <p:nvPr/>
+      </p:nvGrpSpPr>
+      <p:grpSpPr>
+        <a:xfrm>
+          <a:off x="0" y="0"/>
+          <a:ext cx="0" cy="0"/>
+          <a:chOff x="0" y="0"/>
+          <a:chExt cx="0" cy="0"/>
+        </a:xfrm>
+      </p:grpSpPr>
+      <p:sp>
+        <p:nvSpPr>
+          <p:cNvPr id="2" name="Slide Image Placeholder 1"/>
+          <p:cNvSpPr>
+            <a:spLocks noGrp="1" noRot="1" noChangeAspect="1"/>
+          </p:cNvSpPr>
+          <p:nvPr>
+            <p:ph type="sldImg"/>
+          </p:nvPr>
+        </p:nvSpPr>
+        <p:spPr/>
+      </p:sp>
+      <p:sp>
+        <p:nvSpPr>
+          <p:cNvPr id="3" name="Notes Placeholder 2"/>
+          <p:cNvSpPr>
+            <a:spLocks noGrp="1"/>
+          </p:cNvSpPr>
+          <p:nvPr>
+            <p:ph type="body" idx="1"/>
+          </p:nvPr>
+        </p:nvSpPr>
+        <p:spPr/>
+        <p:txBody>
+          <a:bodyPr/>
+          <a:lstStyle/>
+          <a:p>
+            <a:r>
+              <a:rPr lang="en-US" dirty="0"/>
+              <a:t>For those familiar with C/C++, typing is (rather counterintuitively) weaker than in Python, because a pointer of any type can be converted into a pointer of any other type.</a:t>
+            </a:r>
           </a:p>
         </p:txBody>
       </p:sp>
@@ -931,7 +1021,7 @@
           <a:p>
             <a:fld id="{51673806-0BCD-1F42-BAA8-2011034B3C6A}" type="datetimeFigureOut">
               <a:rPr lang="en-US" smtClean="0"/>
-              <a:t>5/8/22</a:t>
+              <a:t>5/9/22</a:t>
             </a:fld>
             <a:endParaRPr lang="en-US"/>
           </a:p>
@@ -1345,7 +1435,7 @@
           <a:p>
             <a:fld id="{51673806-0BCD-1F42-BAA8-2011034B3C6A}" type="datetimeFigureOut">
               <a:rPr lang="en-US" smtClean="0"/>
-              <a:t>5/8/22</a:t>
+              <a:t>5/9/22</a:t>
             </a:fld>
             <a:endParaRPr lang="en-US"/>
           </a:p>
@@ -1676,7 +1766,7 @@
           <a:p>
             <a:fld id="{51673806-0BCD-1F42-BAA8-2011034B3C6A}" type="datetimeFigureOut">
               <a:rPr lang="en-US" smtClean="0"/>
-              <a:t>5/8/22</a:t>
+              <a:t>5/9/22</a:t>
             </a:fld>
             <a:endParaRPr lang="en-US"/>
           </a:p>
@@ -2076,7 +2166,7 @@
           <a:p>
             <a:fld id="{51673806-0BCD-1F42-BAA8-2011034B3C6A}" type="datetimeFigureOut">
               <a:rPr lang="en-US" smtClean="0"/>
-              <a:t>5/8/22</a:t>
+              <a:t>5/9/22</a:t>
             </a:fld>
             <a:endParaRPr lang="en-US"/>
           </a:p>
@@ -2639,7 +2729,7 @@
           <a:p>
             <a:fld id="{51673806-0BCD-1F42-BAA8-2011034B3C6A}" type="datetimeFigureOut">
               <a:rPr lang="en-US" smtClean="0"/>
-              <a:t>5/8/22</a:t>
+              <a:t>5/9/22</a:t>
             </a:fld>
             <a:endParaRPr lang="en-US"/>
           </a:p>
@@ -3315,7 +3405,7 @@
           <a:p>
             <a:fld id="{51673806-0BCD-1F42-BAA8-2011034B3C6A}" type="datetimeFigureOut">
               <a:rPr lang="en-US" smtClean="0"/>
-              <a:t>5/8/22</a:t>
+              <a:t>5/9/22</a:t>
             </a:fld>
             <a:endParaRPr lang="en-US"/>
           </a:p>
@@ -4223,7 +4313,7 @@
           <a:p>
             <a:fld id="{51673806-0BCD-1F42-BAA8-2011034B3C6A}" type="datetimeFigureOut">
               <a:rPr lang="en-US" smtClean="0"/>
-              <a:t>5/8/22</a:t>
+              <a:t>5/9/22</a:t>
             </a:fld>
             <a:endParaRPr lang="en-US"/>
           </a:p>
@@ -4531,7 +4621,7 @@
           <a:p>
             <a:fld id="{51673806-0BCD-1F42-BAA8-2011034B3C6A}" type="datetimeFigureOut">
               <a:rPr lang="en-US" smtClean="0"/>
-              <a:t>5/8/22</a:t>
+              <a:t>5/9/22</a:t>
             </a:fld>
             <a:endParaRPr lang="en-US"/>
           </a:p>
@@ -4790,7 +4880,7 @@
           <a:p>
             <a:fld id="{51673806-0BCD-1F42-BAA8-2011034B3C6A}" type="datetimeFigureOut">
               <a:rPr lang="en-US" smtClean="0"/>
-              <a:t>5/8/22</a:t>
+              <a:t>5/9/22</a:t>
             </a:fld>
             <a:endParaRPr lang="en-US"/>
           </a:p>
@@ -5113,7 +5203,7 @@
           <a:p>
             <a:fld id="{51673806-0BCD-1F42-BAA8-2011034B3C6A}" type="datetimeFigureOut">
               <a:rPr lang="en-US" smtClean="0"/>
-              <a:t>5/8/22</a:t>
+              <a:t>5/9/22</a:t>
             </a:fld>
             <a:endParaRPr lang="en-US"/>
           </a:p>
@@ -5497,7 +5587,7 @@
           <a:p>
             <a:fld id="{51673806-0BCD-1F42-BAA8-2011034B3C6A}" type="datetimeFigureOut">
               <a:rPr lang="en-US" smtClean="0"/>
-              <a:t>5/8/22</a:t>
+              <a:t>5/9/22</a:t>
             </a:fld>
             <a:endParaRPr lang="en-US"/>
           </a:p>
@@ -5873,7 +5963,7 @@
           <a:p>
             <a:fld id="{51673806-0BCD-1F42-BAA8-2011034B3C6A}" type="datetimeFigureOut">
               <a:rPr lang="en-US" smtClean="0"/>
-              <a:t>5/8/22</a:t>
+              <a:t>5/9/22</a:t>
             </a:fld>
             <a:endParaRPr lang="en-US"/>
           </a:p>
@@ -6379,7 +6469,7 @@
           <a:p>
             <a:fld id="{51673806-0BCD-1F42-BAA8-2011034B3C6A}" type="datetimeFigureOut">
               <a:rPr lang="en-US" smtClean="0"/>
-              <a:t>5/8/22</a:t>
+              <a:t>5/9/22</a:t>
             </a:fld>
             <a:endParaRPr lang="en-US"/>
           </a:p>
@@ -6636,7 +6726,7 @@
           <a:p>
             <a:fld id="{51673806-0BCD-1F42-BAA8-2011034B3C6A}" type="datetimeFigureOut">
               <a:rPr lang="en-US" smtClean="0"/>
-              <a:t>5/8/22</a:t>
+              <a:t>5/9/22</a:t>
             </a:fld>
             <a:endParaRPr lang="en-US"/>
           </a:p>
@@ -6794,7 +6884,7 @@
           <a:p>
             <a:fld id="{51673806-0BCD-1F42-BAA8-2011034B3C6A}" type="datetimeFigureOut">
               <a:rPr lang="en-US" smtClean="0"/>
-              <a:t>5/8/22</a:t>
+              <a:t>5/9/22</a:t>
             </a:fld>
             <a:endParaRPr lang="en-US"/>
           </a:p>
@@ -7184,7 +7274,7 @@
           <a:p>
             <a:fld id="{51673806-0BCD-1F42-BAA8-2011034B3C6A}" type="datetimeFigureOut">
               <a:rPr lang="en-US" smtClean="0"/>
-              <a:t>5/8/22</a:t>
+              <a:t>5/9/22</a:t>
             </a:fld>
             <a:endParaRPr lang="en-US"/>
           </a:p>
@@ -7593,7 +7683,7 @@
           <a:p>
             <a:fld id="{51673806-0BCD-1F42-BAA8-2011034B3C6A}" type="datetimeFigureOut">
               <a:rPr lang="en-US" smtClean="0"/>
-              <a:t>5/8/22</a:t>
+              <a:t>5/9/22</a:t>
             </a:fld>
             <a:endParaRPr lang="en-US"/>
           </a:p>
@@ -7839,7 +7929,7 @@
             <a:fld id="{51673806-0BCD-1F42-BAA8-2011034B3C6A}" type="datetimeFigureOut">
               <a:rPr lang="en-US" smtClean="0"/>
               <a:pPr/>
-              <a:t>5/8/22</a:t>
+              <a:t>5/9/22</a:t>
             </a:fld>
             <a:endParaRPr lang="en-US" dirty="0"/>
           </a:p>

</xml_diff>

<commit_message>
presenter notes added to intro and context slides
</commit_message>
<xml_diff>
--- a/slides/context.pptx
+++ b/slides/context.pptx
@@ -204,7 +204,7 @@
           <a:p>
             <a:fld id="{5450099C-8BB7-944A-BC72-CA2F6E7F4B31}" type="datetimeFigureOut">
               <a:rPr lang="en-US" smtClean="0"/>
-              <a:t>5/9/22</a:t>
+              <a:t>5/5/23</a:t>
             </a:fld>
             <a:endParaRPr lang="en-US"/>
           </a:p>
@@ -517,21 +517,8 @@
           <a:p>
             <a:r>
               <a:rPr lang="en-US" dirty="0"/>
-              <a:t>We’ll come back to this later in the </a:t>
-            </a:r>
-            <a:r>
-              <a:rPr lang="en-US" dirty="0" err="1"/>
-              <a:t>bootcamp</a:t>
-            </a:r>
-            <a:r>
-              <a:rPr lang="en-US" dirty="0"/>
-              <a:t> when we talk</a:t>
-            </a:r>
-            <a:r>
-              <a:rPr lang="en-US" baseline="0" dirty="0"/>
-              <a:t> about object oriented programming and this should make much more sense then. </a:t>
-            </a:r>
-            <a:endParaRPr lang="en-US" dirty="0"/>
+              <a:t>This next set of slides is just kind of going to be putting Python into the context of other programming languages and kind of the mechanics behind it. C++ I think is what OSU really pushes in classes, so we’ll kind of compare it to Python to help better put that into context for those of you who have coded before.</a:t>
+            </a:r>
           </a:p>
         </p:txBody>
       </p:sp>
@@ -542,7 +529,7 @@
             <a:spLocks noGrp="1"/>
           </p:cNvSpPr>
           <p:nvPr>
-            <p:ph type="sldNum" sz="quarter" idx="10"/>
+            <p:ph type="sldNum" sz="quarter" idx="5"/>
           </p:nvPr>
         </p:nvSpPr>
         <p:spPr/>
@@ -552,7 +539,7 @@
           <a:p>
             <a:fld id="{5FFDBB08-D643-7140-B45F-C5B77B24C685}" type="slidenum">
               <a:rPr lang="en-US" smtClean="0"/>
-              <a:t>5</a:t>
+              <a:t>1</a:t>
             </a:fld>
             <a:endParaRPr lang="en-US"/>
           </a:p>
@@ -561,7 +548,7 @@
     </p:spTree>
     <p:extLst>
       <p:ext uri="{BB962C8B-B14F-4D97-AF65-F5344CB8AC3E}">
-        <p14:creationId xmlns:p14="http://schemas.microsoft.com/office/powerpoint/2010/main" val="947148062"/>
+        <p14:creationId xmlns:p14="http://schemas.microsoft.com/office/powerpoint/2010/main" val="1301768461"/>
       </p:ext>
     </p:extLst>
   </p:cSld>
@@ -617,6 +604,280 @@
           <a:p>
             <a:r>
               <a:rPr lang="en-US" dirty="0"/>
+              <a:t>Computers run in binary, so all programming languages are translated into those little zeroes and ones. The difference between Python and C++, is that Python is an interpreted language while C++ is a compiled language. The main difference between interpreted languages and compiled languages is just when this translation to binary happens. So for Python, as an interpreted language, that means that code is translated into binary as it runs. C++ on the other hand compiles your code first before running it. Compiling is just a fancy way of saying it’s translated from that programming language to binary. So basically, C++ first translates what you coded into binary (which is compiling) and then the computer runs that binary code that comes out of the compiler. There’s a sort of trade-off to this, Python is easier to write but is also slower to run. C++ on the flip side is difficult to write but faster to run. Whitespace is the indentation level of Python has been criticized for this.</a:t>
+            </a:r>
+          </a:p>
+        </p:txBody>
+      </p:sp>
+      <p:sp>
+        <p:nvSpPr>
+          <p:cNvPr id="4" name="Slide Number Placeholder 3"/>
+          <p:cNvSpPr>
+            <a:spLocks noGrp="1"/>
+          </p:cNvSpPr>
+          <p:nvPr>
+            <p:ph type="sldNum" sz="quarter" idx="5"/>
+          </p:nvPr>
+        </p:nvSpPr>
+        <p:spPr/>
+        <p:txBody>
+          <a:bodyPr/>
+          <a:lstStyle/>
+          <a:p>
+            <a:fld id="{5FFDBB08-D643-7140-B45F-C5B77B24C685}" type="slidenum">
+              <a:rPr lang="en-US" smtClean="0"/>
+              <a:t>3</a:t>
+            </a:fld>
+            <a:endParaRPr lang="en-US"/>
+          </a:p>
+        </p:txBody>
+      </p:sp>
+    </p:spTree>
+    <p:extLst>
+      <p:ext uri="{BB962C8B-B14F-4D97-AF65-F5344CB8AC3E}">
+        <p14:creationId xmlns:p14="http://schemas.microsoft.com/office/powerpoint/2010/main" val="2161142620"/>
+      </p:ext>
+    </p:extLst>
+  </p:cSld>
+  <p:clrMapOvr>
+    <a:masterClrMapping/>
+  </p:clrMapOvr>
+</p:notes>
+</file>
+
+<file path=ppt/notesSlides/notesSlide3.xml><?xml version="1.0" encoding="utf-8"?>
+<p:notes xmlns:a="http://schemas.openxmlformats.org/drawingml/2006/main" xmlns:r="http://schemas.openxmlformats.org/officeDocument/2006/relationships" xmlns:p="http://schemas.openxmlformats.org/presentationml/2006/main">
+  <p:cSld>
+    <p:spTree>
+      <p:nvGrpSpPr>
+        <p:cNvPr id="1" name=""/>
+        <p:cNvGrpSpPr/>
+        <p:nvPr/>
+      </p:nvGrpSpPr>
+      <p:grpSpPr>
+        <a:xfrm>
+          <a:off x="0" y="0"/>
+          <a:ext cx="0" cy="0"/>
+          <a:chOff x="0" y="0"/>
+          <a:chExt cx="0" cy="0"/>
+        </a:xfrm>
+      </p:grpSpPr>
+      <p:sp>
+        <p:nvSpPr>
+          <p:cNvPr id="2" name="Slide Image Placeholder 1"/>
+          <p:cNvSpPr>
+            <a:spLocks noGrp="1" noRot="1" noChangeAspect="1"/>
+          </p:cNvSpPr>
+          <p:nvPr>
+            <p:ph type="sldImg"/>
+          </p:nvPr>
+        </p:nvSpPr>
+        <p:spPr/>
+      </p:sp>
+      <p:sp>
+        <p:nvSpPr>
+          <p:cNvPr id="3" name="Notes Placeholder 2"/>
+          <p:cNvSpPr>
+            <a:spLocks noGrp="1"/>
+          </p:cNvSpPr>
+          <p:nvPr>
+            <p:ph type="body" idx="1"/>
+          </p:nvPr>
+        </p:nvSpPr>
+        <p:spPr/>
+        <p:txBody>
+          <a:bodyPr/>
+          <a:lstStyle/>
+          <a:p>
+            <a:r>
+              <a:rPr lang="en-US" dirty="0"/>
+              <a:t>Interpreter is the program which reads and runs the code, the ‘translator’. This interpreter’s source code is actually written in C. It’s then compiled and then does whatever you said in the Python language. So this makes working between C and Python pretty easy.</a:t>
+            </a:r>
+          </a:p>
+        </p:txBody>
+      </p:sp>
+      <p:sp>
+        <p:nvSpPr>
+          <p:cNvPr id="4" name="Slide Number Placeholder 3"/>
+          <p:cNvSpPr>
+            <a:spLocks noGrp="1"/>
+          </p:cNvSpPr>
+          <p:nvPr>
+            <p:ph type="sldNum" sz="quarter" idx="5"/>
+          </p:nvPr>
+        </p:nvSpPr>
+        <p:spPr/>
+        <p:txBody>
+          <a:bodyPr/>
+          <a:lstStyle/>
+          <a:p>
+            <a:fld id="{5FFDBB08-D643-7140-B45F-C5B77B24C685}" type="slidenum">
+              <a:rPr lang="en-US" smtClean="0"/>
+              <a:t>4</a:t>
+            </a:fld>
+            <a:endParaRPr lang="en-US"/>
+          </a:p>
+        </p:txBody>
+      </p:sp>
+    </p:spTree>
+    <p:extLst>
+      <p:ext uri="{BB962C8B-B14F-4D97-AF65-F5344CB8AC3E}">
+        <p14:creationId xmlns:p14="http://schemas.microsoft.com/office/powerpoint/2010/main" val="1627451850"/>
+      </p:ext>
+    </p:extLst>
+  </p:cSld>
+  <p:clrMapOvr>
+    <a:masterClrMapping/>
+  </p:clrMapOvr>
+</p:notes>
+</file>
+
+<file path=ppt/notesSlides/notesSlide4.xml><?xml version="1.0" encoding="utf-8"?>
+<p:notes xmlns:a="http://schemas.openxmlformats.org/drawingml/2006/main" xmlns:r="http://schemas.openxmlformats.org/officeDocument/2006/relationships" xmlns:p="http://schemas.openxmlformats.org/presentationml/2006/main">
+  <p:cSld>
+    <p:spTree>
+      <p:nvGrpSpPr>
+        <p:cNvPr id="1" name=""/>
+        <p:cNvGrpSpPr/>
+        <p:nvPr/>
+      </p:nvGrpSpPr>
+      <p:grpSpPr>
+        <a:xfrm>
+          <a:off x="0" y="0"/>
+          <a:ext cx="0" cy="0"/>
+          <a:chOff x="0" y="0"/>
+          <a:chExt cx="0" cy="0"/>
+        </a:xfrm>
+      </p:grpSpPr>
+      <p:sp>
+        <p:nvSpPr>
+          <p:cNvPr id="2" name="Slide Image Placeholder 1"/>
+          <p:cNvSpPr>
+            <a:spLocks noGrp="1" noRot="1" noChangeAspect="1"/>
+          </p:cNvSpPr>
+          <p:nvPr>
+            <p:ph type="sldImg"/>
+          </p:nvPr>
+        </p:nvSpPr>
+        <p:spPr/>
+      </p:sp>
+      <p:sp>
+        <p:nvSpPr>
+          <p:cNvPr id="3" name="Notes Placeholder 2"/>
+          <p:cNvSpPr>
+            <a:spLocks noGrp="1"/>
+          </p:cNvSpPr>
+          <p:nvPr>
+            <p:ph type="body" idx="1"/>
+          </p:nvPr>
+        </p:nvSpPr>
+        <p:spPr/>
+        <p:txBody>
+          <a:bodyPr/>
+          <a:lstStyle/>
+          <a:p>
+            <a:r>
+              <a:rPr lang="en-US" dirty="0"/>
+              <a:t>We’ll come back to this later in the </a:t>
+            </a:r>
+            <a:r>
+              <a:rPr lang="en-US" dirty="0" err="1"/>
+              <a:t>bootcamp</a:t>
+            </a:r>
+            <a:r>
+              <a:rPr lang="en-US" dirty="0"/>
+              <a:t> when we talk</a:t>
+            </a:r>
+            <a:r>
+              <a:rPr lang="en-US" baseline="0" dirty="0"/>
+              <a:t> about object oriented programming and this should make much more sense then. </a:t>
+            </a:r>
+            <a:endParaRPr lang="en-US" dirty="0"/>
+          </a:p>
+        </p:txBody>
+      </p:sp>
+      <p:sp>
+        <p:nvSpPr>
+          <p:cNvPr id="4" name="Slide Number Placeholder 3"/>
+          <p:cNvSpPr>
+            <a:spLocks noGrp="1"/>
+          </p:cNvSpPr>
+          <p:nvPr>
+            <p:ph type="sldNum" sz="quarter" idx="10"/>
+          </p:nvPr>
+        </p:nvSpPr>
+        <p:spPr/>
+        <p:txBody>
+          <a:bodyPr/>
+          <a:lstStyle/>
+          <a:p>
+            <a:fld id="{5FFDBB08-D643-7140-B45F-C5B77B24C685}" type="slidenum">
+              <a:rPr lang="en-US" smtClean="0"/>
+              <a:t>5</a:t>
+            </a:fld>
+            <a:endParaRPr lang="en-US"/>
+          </a:p>
+        </p:txBody>
+      </p:sp>
+    </p:spTree>
+    <p:extLst>
+      <p:ext uri="{BB962C8B-B14F-4D97-AF65-F5344CB8AC3E}">
+        <p14:creationId xmlns:p14="http://schemas.microsoft.com/office/powerpoint/2010/main" val="947148062"/>
+      </p:ext>
+    </p:extLst>
+  </p:cSld>
+  <p:clrMapOvr>
+    <a:masterClrMapping/>
+  </p:clrMapOvr>
+</p:notes>
+</file>
+
+<file path=ppt/notesSlides/notesSlide5.xml><?xml version="1.0" encoding="utf-8"?>
+<p:notes xmlns:a="http://schemas.openxmlformats.org/drawingml/2006/main" xmlns:r="http://schemas.openxmlformats.org/officeDocument/2006/relationships" xmlns:p="http://schemas.openxmlformats.org/presentationml/2006/main">
+  <p:cSld>
+    <p:spTree>
+      <p:nvGrpSpPr>
+        <p:cNvPr id="1" name=""/>
+        <p:cNvGrpSpPr/>
+        <p:nvPr/>
+      </p:nvGrpSpPr>
+      <p:grpSpPr>
+        <a:xfrm>
+          <a:off x="0" y="0"/>
+          <a:ext cx="0" cy="0"/>
+          <a:chOff x="0" y="0"/>
+          <a:chExt cx="0" cy="0"/>
+        </a:xfrm>
+      </p:grpSpPr>
+      <p:sp>
+        <p:nvSpPr>
+          <p:cNvPr id="2" name="Slide Image Placeholder 1"/>
+          <p:cNvSpPr>
+            <a:spLocks noGrp="1" noRot="1" noChangeAspect="1"/>
+          </p:cNvSpPr>
+          <p:nvPr>
+            <p:ph type="sldImg"/>
+          </p:nvPr>
+        </p:nvSpPr>
+        <p:spPr/>
+      </p:sp>
+      <p:sp>
+        <p:nvSpPr>
+          <p:cNvPr id="3" name="Notes Placeholder 2"/>
+          <p:cNvSpPr>
+            <a:spLocks noGrp="1"/>
+          </p:cNvSpPr>
+          <p:nvPr>
+            <p:ph type="body" idx="1"/>
+          </p:nvPr>
+        </p:nvSpPr>
+        <p:spPr/>
+        <p:txBody>
+          <a:bodyPr/>
+          <a:lstStyle/>
+          <a:p>
+            <a:r>
+              <a:rPr lang="en-US" dirty="0"/>
               <a:t>Advice: it’s best to be explicit (the Python developers themselves also echo this sentiment a lot), so if you need a specific data type for whatever reason, it’s best to include it in the declaration (e.g. x = float(3))</a:t>
             </a:r>
           </a:p>
@@ -658,7 +919,7 @@
 </p:notes>
 </file>
 
-<file path=ppt/notesSlides/notesSlide3.xml><?xml version="1.0" encoding="utf-8"?>
+<file path=ppt/notesSlides/notesSlide6.xml><?xml version="1.0" encoding="utf-8"?>
 <p:notes xmlns:a="http://schemas.openxmlformats.org/drawingml/2006/main" xmlns:r="http://schemas.openxmlformats.org/officeDocument/2006/relationships" xmlns:p="http://schemas.openxmlformats.org/presentationml/2006/main">
   <p:cSld>
     <p:spTree>
@@ -1021,7 +1282,7 @@
           <a:p>
             <a:fld id="{51673806-0BCD-1F42-BAA8-2011034B3C6A}" type="datetimeFigureOut">
               <a:rPr lang="en-US" smtClean="0"/>
-              <a:t>5/9/22</a:t>
+              <a:t>5/5/23</a:t>
             </a:fld>
             <a:endParaRPr lang="en-US"/>
           </a:p>
@@ -1435,7 +1696,7 @@
           <a:p>
             <a:fld id="{51673806-0BCD-1F42-BAA8-2011034B3C6A}" type="datetimeFigureOut">
               <a:rPr lang="en-US" smtClean="0"/>
-              <a:t>5/9/22</a:t>
+              <a:t>5/5/23</a:t>
             </a:fld>
             <a:endParaRPr lang="en-US"/>
           </a:p>
@@ -1766,7 +2027,7 @@
           <a:p>
             <a:fld id="{51673806-0BCD-1F42-BAA8-2011034B3C6A}" type="datetimeFigureOut">
               <a:rPr lang="en-US" smtClean="0"/>
-              <a:t>5/9/22</a:t>
+              <a:t>5/5/23</a:t>
             </a:fld>
             <a:endParaRPr lang="en-US"/>
           </a:p>
@@ -2166,7 +2427,7 @@
           <a:p>
             <a:fld id="{51673806-0BCD-1F42-BAA8-2011034B3C6A}" type="datetimeFigureOut">
               <a:rPr lang="en-US" smtClean="0"/>
-              <a:t>5/9/22</a:t>
+              <a:t>5/5/23</a:t>
             </a:fld>
             <a:endParaRPr lang="en-US"/>
           </a:p>
@@ -2729,7 +2990,7 @@
           <a:p>
             <a:fld id="{51673806-0BCD-1F42-BAA8-2011034B3C6A}" type="datetimeFigureOut">
               <a:rPr lang="en-US" smtClean="0"/>
-              <a:t>5/9/22</a:t>
+              <a:t>5/5/23</a:t>
             </a:fld>
             <a:endParaRPr lang="en-US"/>
           </a:p>
@@ -3405,7 +3666,7 @@
           <a:p>
             <a:fld id="{51673806-0BCD-1F42-BAA8-2011034B3C6A}" type="datetimeFigureOut">
               <a:rPr lang="en-US" smtClean="0"/>
-              <a:t>5/9/22</a:t>
+              <a:t>5/5/23</a:t>
             </a:fld>
             <a:endParaRPr lang="en-US"/>
           </a:p>
@@ -4313,7 +4574,7 @@
           <a:p>
             <a:fld id="{51673806-0BCD-1F42-BAA8-2011034B3C6A}" type="datetimeFigureOut">
               <a:rPr lang="en-US" smtClean="0"/>
-              <a:t>5/9/22</a:t>
+              <a:t>5/5/23</a:t>
             </a:fld>
             <a:endParaRPr lang="en-US"/>
           </a:p>
@@ -4621,7 +4882,7 @@
           <a:p>
             <a:fld id="{51673806-0BCD-1F42-BAA8-2011034B3C6A}" type="datetimeFigureOut">
               <a:rPr lang="en-US" smtClean="0"/>
-              <a:t>5/9/22</a:t>
+              <a:t>5/5/23</a:t>
             </a:fld>
             <a:endParaRPr lang="en-US"/>
           </a:p>
@@ -4880,7 +5141,7 @@
           <a:p>
             <a:fld id="{51673806-0BCD-1F42-BAA8-2011034B3C6A}" type="datetimeFigureOut">
               <a:rPr lang="en-US" smtClean="0"/>
-              <a:t>5/9/22</a:t>
+              <a:t>5/5/23</a:t>
             </a:fld>
             <a:endParaRPr lang="en-US"/>
           </a:p>
@@ -5203,7 +5464,7 @@
           <a:p>
             <a:fld id="{51673806-0BCD-1F42-BAA8-2011034B3C6A}" type="datetimeFigureOut">
               <a:rPr lang="en-US" smtClean="0"/>
-              <a:t>5/9/22</a:t>
+              <a:t>5/5/23</a:t>
             </a:fld>
             <a:endParaRPr lang="en-US"/>
           </a:p>
@@ -5587,7 +5848,7 @@
           <a:p>
             <a:fld id="{51673806-0BCD-1F42-BAA8-2011034B3C6A}" type="datetimeFigureOut">
               <a:rPr lang="en-US" smtClean="0"/>
-              <a:t>5/9/22</a:t>
+              <a:t>5/5/23</a:t>
             </a:fld>
             <a:endParaRPr lang="en-US"/>
           </a:p>
@@ -5963,7 +6224,7 @@
           <a:p>
             <a:fld id="{51673806-0BCD-1F42-BAA8-2011034B3C6A}" type="datetimeFigureOut">
               <a:rPr lang="en-US" smtClean="0"/>
-              <a:t>5/9/22</a:t>
+              <a:t>5/5/23</a:t>
             </a:fld>
             <a:endParaRPr lang="en-US"/>
           </a:p>
@@ -6469,7 +6730,7 @@
           <a:p>
             <a:fld id="{51673806-0BCD-1F42-BAA8-2011034B3C6A}" type="datetimeFigureOut">
               <a:rPr lang="en-US" smtClean="0"/>
-              <a:t>5/9/22</a:t>
+              <a:t>5/5/23</a:t>
             </a:fld>
             <a:endParaRPr lang="en-US"/>
           </a:p>
@@ -6726,7 +6987,7 @@
           <a:p>
             <a:fld id="{51673806-0BCD-1F42-BAA8-2011034B3C6A}" type="datetimeFigureOut">
               <a:rPr lang="en-US" smtClean="0"/>
-              <a:t>5/9/22</a:t>
+              <a:t>5/5/23</a:t>
             </a:fld>
             <a:endParaRPr lang="en-US"/>
           </a:p>
@@ -6884,7 +7145,7 @@
           <a:p>
             <a:fld id="{51673806-0BCD-1F42-BAA8-2011034B3C6A}" type="datetimeFigureOut">
               <a:rPr lang="en-US" smtClean="0"/>
-              <a:t>5/9/22</a:t>
+              <a:t>5/5/23</a:t>
             </a:fld>
             <a:endParaRPr lang="en-US"/>
           </a:p>
@@ -7274,7 +7535,7 @@
           <a:p>
             <a:fld id="{51673806-0BCD-1F42-BAA8-2011034B3C6A}" type="datetimeFigureOut">
               <a:rPr lang="en-US" smtClean="0"/>
-              <a:t>5/9/22</a:t>
+              <a:t>5/5/23</a:t>
             </a:fld>
             <a:endParaRPr lang="en-US"/>
           </a:p>
@@ -7683,7 +7944,7 @@
           <a:p>
             <a:fld id="{51673806-0BCD-1F42-BAA8-2011034B3C6A}" type="datetimeFigureOut">
               <a:rPr lang="en-US" smtClean="0"/>
-              <a:t>5/9/22</a:t>
+              <a:t>5/5/23</a:t>
             </a:fld>
             <a:endParaRPr lang="en-US"/>
           </a:p>
@@ -7929,7 +8190,7 @@
             <a:fld id="{51673806-0BCD-1F42-BAA8-2011034B3C6A}" type="datetimeFigureOut">
               <a:rPr lang="en-US" smtClean="0"/>
               <a:pPr/>
-              <a:t>5/9/22</a:t>
+              <a:t>5/5/23</a:t>
             </a:fld>
             <a:endParaRPr lang="en-US" dirty="0"/>
           </a:p>

</xml_diff>